<commit_message>
trying to make new figures for the paper
</commit_message>
<xml_diff>
--- a/neo_scf_data_processing/Presentation1.pptx
+++ b/neo_scf_data_processing/Presentation1.pptx
@@ -7,13 +7,20 @@
   <p:sldIdLst>
     <p:sldId id="256" r:id="rId2"/>
     <p:sldId id="257" r:id="rId3"/>
-    <p:sldId id="258" r:id="rId4"/>
-    <p:sldId id="259" r:id="rId5"/>
-    <p:sldId id="260" r:id="rId6"/>
-    <p:sldId id="261" r:id="rId7"/>
-    <p:sldId id="263" r:id="rId8"/>
-    <p:sldId id="264" r:id="rId9"/>
-    <p:sldId id="266" r:id="rId10"/>
+    <p:sldId id="272" r:id="rId4"/>
+    <p:sldId id="271" r:id="rId5"/>
+    <p:sldId id="273" r:id="rId6"/>
+    <p:sldId id="258" r:id="rId7"/>
+    <p:sldId id="259" r:id="rId8"/>
+    <p:sldId id="260" r:id="rId9"/>
+    <p:sldId id="261" r:id="rId10"/>
+    <p:sldId id="263" r:id="rId11"/>
+    <p:sldId id="264" r:id="rId12"/>
+    <p:sldId id="266" r:id="rId13"/>
+    <p:sldId id="267" r:id="rId14"/>
+    <p:sldId id="268" r:id="rId15"/>
+    <p:sldId id="269" r:id="rId16"/>
+    <p:sldId id="270" r:id="rId17"/>
   </p:sldIdLst>
   <p:sldSz cx="12192000" cy="6858000"/>
   <p:notesSz cx="6858000" cy="9144000"/>
@@ -112,6 +119,11 @@
       </a:defRPr>
     </a:lvl9pPr>
   </p:defaultTextStyle>
+  <p:extLst>
+    <p:ext uri="{EFAFB233-063F-42B5-8137-9DF3F51BA10A}">
+      <p15:sldGuideLst xmlns:p15="http://schemas.microsoft.com/office/powerpoint/2012/main"/>
+    </p:ext>
+  </p:extLst>
 </p:presentation>
 </file>
 
@@ -262,7 +274,7 @@
           <a:p>
             <a:fld id="{BD38B81E-318C-6A45-882E-9A6A8F0F2B0B}" type="datetimeFigureOut">
               <a:rPr lang="en-US" smtClean="0"/>
-              <a:t>6/20/22</a:t>
+              <a:t>6/21/22</a:t>
             </a:fld>
             <a:endParaRPr lang="en-US"/>
           </a:p>
@@ -460,7 +472,7 @@
           <a:p>
             <a:fld id="{BD38B81E-318C-6A45-882E-9A6A8F0F2B0B}" type="datetimeFigureOut">
               <a:rPr lang="en-US" smtClean="0"/>
-              <a:t>6/20/22</a:t>
+              <a:t>6/21/22</a:t>
             </a:fld>
             <a:endParaRPr lang="en-US"/>
           </a:p>
@@ -668,7 +680,7 @@
           <a:p>
             <a:fld id="{BD38B81E-318C-6A45-882E-9A6A8F0F2B0B}" type="datetimeFigureOut">
               <a:rPr lang="en-US" smtClean="0"/>
-              <a:t>6/20/22</a:t>
+              <a:t>6/21/22</a:t>
             </a:fld>
             <a:endParaRPr lang="en-US"/>
           </a:p>
@@ -866,7 +878,7 @@
           <a:p>
             <a:fld id="{BD38B81E-318C-6A45-882E-9A6A8F0F2B0B}" type="datetimeFigureOut">
               <a:rPr lang="en-US" smtClean="0"/>
-              <a:t>6/20/22</a:t>
+              <a:t>6/21/22</a:t>
             </a:fld>
             <a:endParaRPr lang="en-US"/>
           </a:p>
@@ -1141,7 +1153,7 @@
           <a:p>
             <a:fld id="{BD38B81E-318C-6A45-882E-9A6A8F0F2B0B}" type="datetimeFigureOut">
               <a:rPr lang="en-US" smtClean="0"/>
-              <a:t>6/20/22</a:t>
+              <a:t>6/21/22</a:t>
             </a:fld>
             <a:endParaRPr lang="en-US"/>
           </a:p>
@@ -1406,7 +1418,7 @@
           <a:p>
             <a:fld id="{BD38B81E-318C-6A45-882E-9A6A8F0F2B0B}" type="datetimeFigureOut">
               <a:rPr lang="en-US" smtClean="0"/>
-              <a:t>6/20/22</a:t>
+              <a:t>6/21/22</a:t>
             </a:fld>
             <a:endParaRPr lang="en-US"/>
           </a:p>
@@ -1818,7 +1830,7 @@
           <a:p>
             <a:fld id="{BD38B81E-318C-6A45-882E-9A6A8F0F2B0B}" type="datetimeFigureOut">
               <a:rPr lang="en-US" smtClean="0"/>
-              <a:t>6/20/22</a:t>
+              <a:t>6/21/22</a:t>
             </a:fld>
             <a:endParaRPr lang="en-US"/>
           </a:p>
@@ -1959,7 +1971,7 @@
           <a:p>
             <a:fld id="{BD38B81E-318C-6A45-882E-9A6A8F0F2B0B}" type="datetimeFigureOut">
               <a:rPr lang="en-US" smtClean="0"/>
-              <a:t>6/20/22</a:t>
+              <a:t>6/21/22</a:t>
             </a:fld>
             <a:endParaRPr lang="en-US"/>
           </a:p>
@@ -2072,7 +2084,7 @@
           <a:p>
             <a:fld id="{BD38B81E-318C-6A45-882E-9A6A8F0F2B0B}" type="datetimeFigureOut">
               <a:rPr lang="en-US" smtClean="0"/>
-              <a:t>6/20/22</a:t>
+              <a:t>6/21/22</a:t>
             </a:fld>
             <a:endParaRPr lang="en-US"/>
           </a:p>
@@ -2383,7 +2395,7 @@
           <a:p>
             <a:fld id="{BD38B81E-318C-6A45-882E-9A6A8F0F2B0B}" type="datetimeFigureOut">
               <a:rPr lang="en-US" smtClean="0"/>
-              <a:t>6/20/22</a:t>
+              <a:t>6/21/22</a:t>
             </a:fld>
             <a:endParaRPr lang="en-US"/>
           </a:p>
@@ -2671,7 +2683,7 @@
           <a:p>
             <a:fld id="{BD38B81E-318C-6A45-882E-9A6A8F0F2B0B}" type="datetimeFigureOut">
               <a:rPr lang="en-US" smtClean="0"/>
-              <a:t>6/20/22</a:t>
+              <a:t>6/21/22</a:t>
             </a:fld>
             <a:endParaRPr lang="en-US"/>
           </a:p>
@@ -2912,7 +2924,7 @@
           <a:p>
             <a:fld id="{BD38B81E-318C-6A45-882E-9A6A8F0F2B0B}" type="datetimeFigureOut">
               <a:rPr lang="en-US" smtClean="0"/>
-              <a:t>6/20/22</a:t>
+              <a:t>6/21/22</a:t>
             </a:fld>
             <a:endParaRPr lang="en-US"/>
           </a:p>
@@ -3352,7 +3364,15 @@
           <a:p>
             <a:r>
               <a:rPr lang="en-US" dirty="0"/>
-              <a:t>Remaking Figure 4&amp;5 of the Paper</a:t>
+              <a:t>Updates on </a:t>
+            </a:r>
+            <a:r>
+              <a:rPr lang="en-US" dirty="0" err="1"/>
+              <a:t>Simulteneous</a:t>
+            </a:r>
+            <a:r>
+              <a:rPr lang="en-US" dirty="0"/>
+              <a:t> NEO-SCF</a:t>
             </a:r>
           </a:p>
         </p:txBody>
@@ -3394,6 +3414,2348 @@
     <p:extLst>
       <p:ext uri="{BB962C8B-B14F-4D97-AF65-F5344CB8AC3E}">
         <p14:creationId xmlns:p14="http://schemas.microsoft.com/office/powerpoint/2010/main" val="2618031366"/>
+      </p:ext>
+    </p:extLst>
+  </p:cSld>
+  <p:clrMapOvr>
+    <a:masterClrMapping/>
+  </p:clrMapOvr>
+</p:sld>
+</file>
+
+<file path=ppt/slides/slide10.xml><?xml version="1.0" encoding="utf-8"?>
+<p:sld xmlns:a="http://schemas.openxmlformats.org/drawingml/2006/main" xmlns:r="http://schemas.openxmlformats.org/officeDocument/2006/relationships" xmlns:p="http://schemas.openxmlformats.org/presentationml/2006/main">
+  <p:cSld>
+    <p:spTree>
+      <p:nvGrpSpPr>
+        <p:cNvPr id="1" name=""/>
+        <p:cNvGrpSpPr/>
+        <p:nvPr/>
+      </p:nvGrpSpPr>
+      <p:grpSpPr>
+        <a:xfrm>
+          <a:off x="0" y="0"/>
+          <a:ext cx="0" cy="0"/>
+          <a:chOff x="0" y="0"/>
+          <a:chExt cx="0" cy="0"/>
+        </a:xfrm>
+      </p:grpSpPr>
+      <p:sp>
+        <p:nvSpPr>
+          <p:cNvPr id="2" name="Title 1">
+            <a:extLst>
+              <a:ext uri="{FF2B5EF4-FFF2-40B4-BE49-F238E27FC236}">
+                <a16:creationId xmlns:a16="http://schemas.microsoft.com/office/drawing/2014/main" id="{40BB8ABF-5C4A-7752-2282-C1E719C44441}"/>
+              </a:ext>
+            </a:extLst>
+          </p:cNvPr>
+          <p:cNvSpPr>
+            <a:spLocks noGrp="1"/>
+          </p:cNvSpPr>
+          <p:nvPr>
+            <p:ph type="title"/>
+          </p:nvPr>
+        </p:nvSpPr>
+        <p:spPr>
+          <a:xfrm>
+            <a:off x="120382" y="-4393"/>
+            <a:ext cx="11512826" cy="1325563"/>
+          </a:xfrm>
+        </p:spPr>
+        <p:txBody>
+          <a:bodyPr/>
+          <a:lstStyle/>
+          <a:p>
+            <a:r>
+              <a:rPr lang="en-US" dirty="0"/>
+              <a:t>Result:</a:t>
+            </a:r>
+          </a:p>
+        </p:txBody>
+      </p:sp>
+      <p:pic>
+        <p:nvPicPr>
+          <p:cNvPr id="7" name="Picture 6">
+            <a:extLst>
+              <a:ext uri="{FF2B5EF4-FFF2-40B4-BE49-F238E27FC236}">
+                <a16:creationId xmlns:a16="http://schemas.microsoft.com/office/drawing/2014/main" id="{3DBAFF5A-949B-3386-482E-16A0530593FD}"/>
+              </a:ext>
+            </a:extLst>
+          </p:cNvPr>
+          <p:cNvPicPr>
+            <a:picLocks noChangeAspect="1"/>
+          </p:cNvPicPr>
+          <p:nvPr/>
+        </p:nvPicPr>
+        <p:blipFill>
+          <a:blip r:embed="rId2"/>
+          <a:stretch>
+            <a:fillRect/>
+          </a:stretch>
+        </p:blipFill>
+        <p:spPr>
+          <a:xfrm>
+            <a:off x="3582966" y="532487"/>
+            <a:ext cx="9707149" cy="6471433"/>
+          </a:xfrm>
+          <a:prstGeom prst="rect">
+            <a:avLst/>
+          </a:prstGeom>
+        </p:spPr>
+      </p:pic>
+      <p:sp>
+        <p:nvSpPr>
+          <p:cNvPr id="8" name="TextBox 7">
+            <a:extLst>
+              <a:ext uri="{FF2B5EF4-FFF2-40B4-BE49-F238E27FC236}">
+                <a16:creationId xmlns:a16="http://schemas.microsoft.com/office/drawing/2014/main" id="{19485207-76E5-8EAF-398D-52203F232DC2}"/>
+              </a:ext>
+            </a:extLst>
+          </p:cNvPr>
+          <p:cNvSpPr txBox="1"/>
+          <p:nvPr/>
+        </p:nvSpPr>
+        <p:spPr>
+          <a:xfrm>
+            <a:off x="76541" y="1479029"/>
+            <a:ext cx="3837844" cy="5016758"/>
+          </a:xfrm>
+          <a:prstGeom prst="rect">
+            <a:avLst/>
+          </a:prstGeom>
+          <a:noFill/>
+        </p:spPr>
+        <p:txBody>
+          <a:bodyPr wrap="square" rtlCol="0">
+            <a:spAutoFit/>
+          </a:bodyPr>
+          <a:lstStyle/>
+          <a:p>
+            <a:r>
+              <a:rPr lang="en-US" sz="2000" dirty="0"/>
+              <a:t>We know from experience that the protonic system is generally harder to converge. And simultaneous optimization can help converge protonic faster.</a:t>
+            </a:r>
+          </a:p>
+          <a:p>
+            <a:endParaRPr lang="en-US" sz="2000" dirty="0"/>
+          </a:p>
+          <a:p>
+            <a:endParaRPr lang="en-US" sz="2000" dirty="0"/>
+          </a:p>
+          <a:p>
+            <a:r>
+              <a:rPr lang="en-US" sz="2000" dirty="0"/>
+              <a:t>Therefore, as one would expect, when protonic basis gets larger, and the protonic basis size gets more comparable to electronic basis size, we see a better saving vs the traditional stepwise optimization</a:t>
+            </a:r>
+          </a:p>
+          <a:p>
+            <a:endParaRPr lang="en-US" sz="2000" dirty="0"/>
+          </a:p>
+          <a:p>
+            <a:endParaRPr lang="en-US" sz="2000" dirty="0"/>
+          </a:p>
+        </p:txBody>
+      </p:sp>
+    </p:spTree>
+    <p:extLst>
+      <p:ext uri="{BB962C8B-B14F-4D97-AF65-F5344CB8AC3E}">
+        <p14:creationId xmlns:p14="http://schemas.microsoft.com/office/powerpoint/2010/main" val="2442417095"/>
+      </p:ext>
+    </p:extLst>
+  </p:cSld>
+  <p:clrMapOvr>
+    <a:masterClrMapping/>
+  </p:clrMapOvr>
+</p:sld>
+</file>
+
+<file path=ppt/slides/slide11.xml><?xml version="1.0" encoding="utf-8"?>
+<p:sld xmlns:a="http://schemas.openxmlformats.org/drawingml/2006/main" xmlns:r="http://schemas.openxmlformats.org/officeDocument/2006/relationships" xmlns:p="http://schemas.openxmlformats.org/presentationml/2006/main">
+  <p:cSld>
+    <p:spTree>
+      <p:nvGrpSpPr>
+        <p:cNvPr id="1" name=""/>
+        <p:cNvGrpSpPr/>
+        <p:nvPr/>
+      </p:nvGrpSpPr>
+      <p:grpSpPr>
+        <a:xfrm>
+          <a:off x="0" y="0"/>
+          <a:ext cx="0" cy="0"/>
+          <a:chOff x="0" y="0"/>
+          <a:chExt cx="0" cy="0"/>
+        </a:xfrm>
+      </p:grpSpPr>
+      <p:sp>
+        <p:nvSpPr>
+          <p:cNvPr id="2" name="Title 1">
+            <a:extLst>
+              <a:ext uri="{FF2B5EF4-FFF2-40B4-BE49-F238E27FC236}">
+                <a16:creationId xmlns:a16="http://schemas.microsoft.com/office/drawing/2014/main" id="{40BB8ABF-5C4A-7752-2282-C1E719C44441}"/>
+              </a:ext>
+            </a:extLst>
+          </p:cNvPr>
+          <p:cNvSpPr>
+            <a:spLocks noGrp="1"/>
+          </p:cNvSpPr>
+          <p:nvPr>
+            <p:ph type="title"/>
+          </p:nvPr>
+        </p:nvSpPr>
+        <p:spPr>
+          <a:xfrm>
+            <a:off x="120382" y="-4393"/>
+            <a:ext cx="11512826" cy="1325563"/>
+          </a:xfrm>
+        </p:spPr>
+        <p:txBody>
+          <a:bodyPr/>
+          <a:lstStyle/>
+          <a:p>
+            <a:r>
+              <a:rPr lang="en-US" dirty="0"/>
+              <a:t>Zoom in on lower left:</a:t>
+            </a:r>
+          </a:p>
+        </p:txBody>
+      </p:sp>
+      <p:pic>
+        <p:nvPicPr>
+          <p:cNvPr id="6" name="Picture 5">
+            <a:extLst>
+              <a:ext uri="{FF2B5EF4-FFF2-40B4-BE49-F238E27FC236}">
+                <a16:creationId xmlns:a16="http://schemas.microsoft.com/office/drawing/2014/main" id="{4F2C7842-7A28-36BC-94C5-9DA9B6193544}"/>
+              </a:ext>
+            </a:extLst>
+          </p:cNvPr>
+          <p:cNvPicPr>
+            <a:picLocks noChangeAspect="1"/>
+          </p:cNvPicPr>
+          <p:nvPr/>
+        </p:nvPicPr>
+        <p:blipFill>
+          <a:blip r:embed="rId2"/>
+          <a:stretch>
+            <a:fillRect/>
+          </a:stretch>
+        </p:blipFill>
+        <p:spPr>
+          <a:xfrm>
+            <a:off x="6159853" y="605609"/>
+            <a:ext cx="6773269" cy="4515513"/>
+          </a:xfrm>
+          <a:prstGeom prst="rect">
+            <a:avLst/>
+          </a:prstGeom>
+        </p:spPr>
+      </p:pic>
+      <p:pic>
+        <p:nvPicPr>
+          <p:cNvPr id="10" name="Picture 9">
+            <a:extLst>
+              <a:ext uri="{FF2B5EF4-FFF2-40B4-BE49-F238E27FC236}">
+                <a16:creationId xmlns:a16="http://schemas.microsoft.com/office/drawing/2014/main" id="{87DD6CD7-BFF4-2350-D267-0A914AE7B493}"/>
+              </a:ext>
+            </a:extLst>
+          </p:cNvPr>
+          <p:cNvPicPr>
+            <a:picLocks noChangeAspect="1"/>
+          </p:cNvPicPr>
+          <p:nvPr/>
+        </p:nvPicPr>
+        <p:blipFill>
+          <a:blip r:embed="rId3"/>
+          <a:stretch>
+            <a:fillRect/>
+          </a:stretch>
+        </p:blipFill>
+        <p:spPr>
+          <a:xfrm>
+            <a:off x="-111861" y="533128"/>
+            <a:ext cx="6773269" cy="4515513"/>
+          </a:xfrm>
+          <a:prstGeom prst="rect">
+            <a:avLst/>
+          </a:prstGeom>
+        </p:spPr>
+      </p:pic>
+      <p:sp>
+        <p:nvSpPr>
+          <p:cNvPr id="14" name="TextBox 13">
+            <a:extLst>
+              <a:ext uri="{FF2B5EF4-FFF2-40B4-BE49-F238E27FC236}">
+                <a16:creationId xmlns:a16="http://schemas.microsoft.com/office/drawing/2014/main" id="{A8B91711-15B8-2FEC-1225-58844E3BF7E1}"/>
+              </a:ext>
+            </a:extLst>
+          </p:cNvPr>
+          <p:cNvSpPr txBox="1"/>
+          <p:nvPr/>
+        </p:nvSpPr>
+        <p:spPr>
+          <a:xfrm>
+            <a:off x="266177" y="5124543"/>
+            <a:ext cx="11527078" cy="1323439"/>
+          </a:xfrm>
+          <a:prstGeom prst="rect">
+            <a:avLst/>
+          </a:prstGeom>
+          <a:noFill/>
+        </p:spPr>
+        <p:txBody>
+          <a:bodyPr wrap="square" rtlCol="0">
+            <a:spAutoFit/>
+          </a:bodyPr>
+          <a:lstStyle/>
+          <a:p>
+            <a:pPr marL="285750" indent="-285750">
+              <a:buFont typeface="Arial" panose="020B0604020202020204" pitchFamily="34" charset="0"/>
+              <a:buChar char="•"/>
+            </a:pPr>
+            <a:r>
+              <a:rPr lang="en-US" sz="2000" dirty="0"/>
+              <a:t>The lower left part of the last slide was strange, so we zoom in to see what’s going on</a:t>
+            </a:r>
+          </a:p>
+          <a:p>
+            <a:pPr marL="285750" indent="-285750">
+              <a:buFont typeface="Arial" panose="020B0604020202020204" pitchFamily="34" charset="0"/>
+              <a:buChar char="•"/>
+            </a:pPr>
+            <a:r>
+              <a:rPr lang="en-US" sz="2000" dirty="0"/>
+              <a:t>I labeled ‘first letter of the structure | electronic basis | protonic </a:t>
+            </a:r>
+            <a:r>
+              <a:rPr lang="en-US" sz="2000" dirty="0" err="1"/>
+              <a:t>basis’</a:t>
+            </a:r>
+            <a:r>
+              <a:rPr lang="en-US" sz="2000" dirty="0"/>
+              <a:t> on the graph</a:t>
+            </a:r>
+          </a:p>
+          <a:p>
+            <a:pPr marL="285750" indent="-285750">
+              <a:buFont typeface="Arial" panose="020B0604020202020204" pitchFamily="34" charset="0"/>
+              <a:buChar char="•"/>
+            </a:pPr>
+            <a:r>
+              <a:rPr lang="en-US" sz="2000" dirty="0"/>
+              <a:t>It seems like the random trend on the lower left was caused by </a:t>
+            </a:r>
+            <a:r>
+              <a:rPr lang="en-US" sz="2000" dirty="0" err="1"/>
+              <a:t>prot-sp</a:t>
+            </a:r>
+            <a:r>
+              <a:rPr lang="en-US" sz="2000" dirty="0"/>
+              <a:t> basis, combining with very large electronic basis set. I suggest we remove </a:t>
+            </a:r>
+            <a:r>
+              <a:rPr lang="en-US" sz="2000" dirty="0" err="1"/>
+              <a:t>prot-sp</a:t>
+            </a:r>
+            <a:r>
+              <a:rPr lang="en-US" sz="2000" dirty="0"/>
+              <a:t> data to see the trend clearer. </a:t>
+            </a:r>
+          </a:p>
+        </p:txBody>
+      </p:sp>
+    </p:spTree>
+    <p:extLst>
+      <p:ext uri="{BB962C8B-B14F-4D97-AF65-F5344CB8AC3E}">
+        <p14:creationId xmlns:p14="http://schemas.microsoft.com/office/powerpoint/2010/main" val="4037144729"/>
+      </p:ext>
+    </p:extLst>
+  </p:cSld>
+  <p:clrMapOvr>
+    <a:masterClrMapping/>
+  </p:clrMapOvr>
+</p:sld>
+</file>
+
+<file path=ppt/slides/slide12.xml><?xml version="1.0" encoding="utf-8"?>
+<p:sld xmlns:a="http://schemas.openxmlformats.org/drawingml/2006/main" xmlns:r="http://schemas.openxmlformats.org/officeDocument/2006/relationships" xmlns:p="http://schemas.openxmlformats.org/presentationml/2006/main">
+  <p:cSld>
+    <p:spTree>
+      <p:nvGrpSpPr>
+        <p:cNvPr id="1" name=""/>
+        <p:cNvGrpSpPr/>
+        <p:nvPr/>
+      </p:nvGrpSpPr>
+      <p:grpSpPr>
+        <a:xfrm>
+          <a:off x="0" y="0"/>
+          <a:ext cx="0" cy="0"/>
+          <a:chOff x="0" y="0"/>
+          <a:chExt cx="0" cy="0"/>
+        </a:xfrm>
+      </p:grpSpPr>
+      <p:sp>
+        <p:nvSpPr>
+          <p:cNvPr id="2" name="Title 1">
+            <a:extLst>
+              <a:ext uri="{FF2B5EF4-FFF2-40B4-BE49-F238E27FC236}">
+                <a16:creationId xmlns:a16="http://schemas.microsoft.com/office/drawing/2014/main" id="{40BB8ABF-5C4A-7752-2282-C1E719C44441}"/>
+              </a:ext>
+            </a:extLst>
+          </p:cNvPr>
+          <p:cNvSpPr>
+            <a:spLocks noGrp="1"/>
+          </p:cNvSpPr>
+          <p:nvPr>
+            <p:ph type="title"/>
+          </p:nvPr>
+        </p:nvSpPr>
+        <p:spPr>
+          <a:xfrm>
+            <a:off x="120382" y="-4393"/>
+            <a:ext cx="11512826" cy="1325563"/>
+          </a:xfrm>
+        </p:spPr>
+        <p:txBody>
+          <a:bodyPr/>
+          <a:lstStyle/>
+          <a:p>
+            <a:r>
+              <a:rPr lang="en-US" dirty="0"/>
+              <a:t>Result (removing </a:t>
+            </a:r>
+            <a:r>
+              <a:rPr lang="en-US" dirty="0" err="1"/>
+              <a:t>prot-sp</a:t>
+            </a:r>
+            <a:r>
+              <a:rPr lang="en-US" dirty="0"/>
+              <a:t> basis)</a:t>
+            </a:r>
+          </a:p>
+        </p:txBody>
+      </p:sp>
+      <p:pic>
+        <p:nvPicPr>
+          <p:cNvPr id="4" name="Picture 3">
+            <a:extLst>
+              <a:ext uri="{FF2B5EF4-FFF2-40B4-BE49-F238E27FC236}">
+                <a16:creationId xmlns:a16="http://schemas.microsoft.com/office/drawing/2014/main" id="{A21CB76D-183D-5D7E-9764-25907A40EFD9}"/>
+              </a:ext>
+            </a:extLst>
+          </p:cNvPr>
+          <p:cNvPicPr>
+            <a:picLocks noChangeAspect="1"/>
+          </p:cNvPicPr>
+          <p:nvPr/>
+        </p:nvPicPr>
+        <p:blipFill>
+          <a:blip r:embed="rId2"/>
+          <a:stretch>
+            <a:fillRect/>
+          </a:stretch>
+        </p:blipFill>
+        <p:spPr>
+          <a:xfrm>
+            <a:off x="1503124" y="225468"/>
+            <a:ext cx="10287000" cy="6858000"/>
+          </a:xfrm>
+          <a:prstGeom prst="rect">
+            <a:avLst/>
+          </a:prstGeom>
+        </p:spPr>
+      </p:pic>
+    </p:spTree>
+    <p:extLst>
+      <p:ext uri="{BB962C8B-B14F-4D97-AF65-F5344CB8AC3E}">
+        <p14:creationId xmlns:p14="http://schemas.microsoft.com/office/powerpoint/2010/main" val="1262847335"/>
+      </p:ext>
+    </p:extLst>
+  </p:cSld>
+  <p:clrMapOvr>
+    <a:masterClrMapping/>
+  </p:clrMapOvr>
+</p:sld>
+</file>
+
+<file path=ppt/slides/slide13.xml><?xml version="1.0" encoding="utf-8"?>
+<p:sld xmlns:a="http://schemas.openxmlformats.org/drawingml/2006/main" xmlns:r="http://schemas.openxmlformats.org/officeDocument/2006/relationships" xmlns:p="http://schemas.openxmlformats.org/presentationml/2006/main">
+  <p:cSld>
+    <p:spTree>
+      <p:nvGrpSpPr>
+        <p:cNvPr id="1" name=""/>
+        <p:cNvGrpSpPr/>
+        <p:nvPr/>
+      </p:nvGrpSpPr>
+      <p:grpSpPr>
+        <a:xfrm>
+          <a:off x="0" y="0"/>
+          <a:ext cx="0" cy="0"/>
+          <a:chOff x="0" y="0"/>
+          <a:chExt cx="0" cy="0"/>
+        </a:xfrm>
+      </p:grpSpPr>
+      <p:sp>
+        <p:nvSpPr>
+          <p:cNvPr id="2" name="Title 1">
+            <a:extLst>
+              <a:ext uri="{FF2B5EF4-FFF2-40B4-BE49-F238E27FC236}">
+                <a16:creationId xmlns:a16="http://schemas.microsoft.com/office/drawing/2014/main" id="{40BB8ABF-5C4A-7752-2282-C1E719C44441}"/>
+              </a:ext>
+            </a:extLst>
+          </p:cNvPr>
+          <p:cNvSpPr>
+            <a:spLocks noGrp="1"/>
+          </p:cNvSpPr>
+          <p:nvPr>
+            <p:ph type="title"/>
+          </p:nvPr>
+        </p:nvSpPr>
+        <p:spPr>
+          <a:xfrm>
+            <a:off x="339587" y="146464"/>
+            <a:ext cx="11512826" cy="1325563"/>
+          </a:xfrm>
+        </p:spPr>
+        <p:txBody>
+          <a:bodyPr/>
+          <a:lstStyle/>
+          <a:p>
+            <a:r>
+              <a:rPr lang="en-US" dirty="0"/>
+              <a:t>Other ways to present data</a:t>
+            </a:r>
+          </a:p>
+        </p:txBody>
+      </p:sp>
+      <p:pic>
+        <p:nvPicPr>
+          <p:cNvPr id="9" name="Picture 8">
+            <a:extLst>
+              <a:ext uri="{FF2B5EF4-FFF2-40B4-BE49-F238E27FC236}">
+                <a16:creationId xmlns:a16="http://schemas.microsoft.com/office/drawing/2014/main" id="{7C5330B2-74D6-F381-D2DB-4337719D667F}"/>
+              </a:ext>
+            </a:extLst>
+          </p:cNvPr>
+          <p:cNvPicPr>
+            <a:picLocks noChangeAspect="1"/>
+          </p:cNvPicPr>
+          <p:nvPr/>
+        </p:nvPicPr>
+        <p:blipFill>
+          <a:blip r:embed="rId2"/>
+          <a:stretch>
+            <a:fillRect/>
+          </a:stretch>
+        </p:blipFill>
+        <p:spPr>
+          <a:xfrm>
+            <a:off x="1014283" y="1728197"/>
+            <a:ext cx="2766764" cy="2075073"/>
+          </a:xfrm>
+          <a:prstGeom prst="rect">
+            <a:avLst/>
+          </a:prstGeom>
+        </p:spPr>
+      </p:pic>
+      <p:sp>
+        <p:nvSpPr>
+          <p:cNvPr id="13" name="TextBox 12">
+            <a:extLst>
+              <a:ext uri="{FF2B5EF4-FFF2-40B4-BE49-F238E27FC236}">
+                <a16:creationId xmlns:a16="http://schemas.microsoft.com/office/drawing/2014/main" id="{E9D25657-DE94-D802-8CB0-4EBA79C2CA14}"/>
+              </a:ext>
+            </a:extLst>
+          </p:cNvPr>
+          <p:cNvSpPr txBox="1"/>
+          <p:nvPr/>
+        </p:nvSpPr>
+        <p:spPr>
+          <a:xfrm>
+            <a:off x="946129" y="1198562"/>
+            <a:ext cx="3695178" cy="369332"/>
+          </a:xfrm>
+          <a:prstGeom prst="rect">
+            <a:avLst/>
+          </a:prstGeom>
+          <a:noFill/>
+        </p:spPr>
+        <p:txBody>
+          <a:bodyPr wrap="square" rtlCol="0">
+            <a:spAutoFit/>
+          </a:bodyPr>
+          <a:lstStyle/>
+          <a:p>
+            <a:r>
+              <a:rPr lang="en-US" dirty="0"/>
+              <a:t>Figure 4 After fixing the bug:  </a:t>
+            </a:r>
+          </a:p>
+        </p:txBody>
+      </p:sp>
+      <p:sp>
+        <p:nvSpPr>
+          <p:cNvPr id="10" name="TextBox 9">
+            <a:extLst>
+              <a:ext uri="{FF2B5EF4-FFF2-40B4-BE49-F238E27FC236}">
+                <a16:creationId xmlns:a16="http://schemas.microsoft.com/office/drawing/2014/main" id="{C7598C50-B958-D9F6-9462-88AA29BE8DDD}"/>
+              </a:ext>
+            </a:extLst>
+          </p:cNvPr>
+          <p:cNvSpPr txBox="1"/>
+          <p:nvPr/>
+        </p:nvSpPr>
+        <p:spPr>
+          <a:xfrm>
+            <a:off x="895013" y="4004733"/>
+            <a:ext cx="3695178" cy="369332"/>
+          </a:xfrm>
+          <a:prstGeom prst="rect">
+            <a:avLst/>
+          </a:prstGeom>
+          <a:noFill/>
+        </p:spPr>
+        <p:txBody>
+          <a:bodyPr wrap="square" rtlCol="0">
+            <a:spAutoFit/>
+          </a:bodyPr>
+          <a:lstStyle/>
+          <a:p>
+            <a:r>
+              <a:rPr lang="en-US" dirty="0"/>
+              <a:t>Figure 5 After fixing the bug:  </a:t>
+            </a:r>
+          </a:p>
+        </p:txBody>
+      </p:sp>
+      <p:pic>
+        <p:nvPicPr>
+          <p:cNvPr id="11" name="Content Placeholder 5">
+            <a:extLst>
+              <a:ext uri="{FF2B5EF4-FFF2-40B4-BE49-F238E27FC236}">
+                <a16:creationId xmlns:a16="http://schemas.microsoft.com/office/drawing/2014/main" id="{27CBEB70-C144-BC20-0BCA-E027F81BA589}"/>
+              </a:ext>
+            </a:extLst>
+          </p:cNvPr>
+          <p:cNvPicPr>
+            <a:picLocks noGrp="1" noChangeAspect="1"/>
+          </p:cNvPicPr>
+          <p:nvPr>
+            <p:ph idx="1"/>
+          </p:nvPr>
+        </p:nvPicPr>
+        <p:blipFill>
+          <a:blip r:embed="rId3"/>
+          <a:stretch>
+            <a:fillRect/>
+          </a:stretch>
+        </p:blipFill>
+        <p:spPr>
+          <a:xfrm>
+            <a:off x="946129" y="4575528"/>
+            <a:ext cx="2766764" cy="2075074"/>
+          </a:xfrm>
+        </p:spPr>
+      </p:pic>
+      <p:sp>
+        <p:nvSpPr>
+          <p:cNvPr id="5" name="TextBox 4">
+            <a:extLst>
+              <a:ext uri="{FF2B5EF4-FFF2-40B4-BE49-F238E27FC236}">
+                <a16:creationId xmlns:a16="http://schemas.microsoft.com/office/drawing/2014/main" id="{5B133A1E-5E69-1ADB-582D-65458B1A9C5D}"/>
+              </a:ext>
+            </a:extLst>
+          </p:cNvPr>
+          <p:cNvSpPr txBox="1"/>
+          <p:nvPr/>
+        </p:nvSpPr>
+        <p:spPr>
+          <a:xfrm>
+            <a:off x="4356179" y="1205374"/>
+            <a:ext cx="6707493" cy="10248960"/>
+          </a:xfrm>
+          <a:prstGeom prst="rect">
+            <a:avLst/>
+          </a:prstGeom>
+          <a:noFill/>
+        </p:spPr>
+        <p:txBody>
+          <a:bodyPr wrap="square" rtlCol="0">
+            <a:spAutoFit/>
+          </a:bodyPr>
+          <a:lstStyle/>
+          <a:p>
+            <a:pPr marL="342900" indent="-342900">
+              <a:buFont typeface="Arial" panose="020B0604020202020204" pitchFamily="34" charset="0"/>
+              <a:buChar char="•"/>
+            </a:pPr>
+            <a:r>
+              <a:rPr lang="en-US" sz="2400" dirty="0"/>
+              <a:t>As we saw from the benchmarking results, Figure 4&amp;5 can not properly show the acceleration.</a:t>
+            </a:r>
+          </a:p>
+          <a:p>
+            <a:pPr marL="342900" indent="-342900">
+              <a:buFont typeface="Arial" panose="020B0604020202020204" pitchFamily="34" charset="0"/>
+              <a:buChar char="•"/>
+            </a:pPr>
+            <a:endParaRPr lang="en-US" sz="2400" dirty="0"/>
+          </a:p>
+          <a:p>
+            <a:pPr marL="342900" indent="-342900">
+              <a:buFont typeface="Arial" panose="020B0604020202020204" pitchFamily="34" charset="0"/>
+              <a:buChar char="•"/>
+            </a:pPr>
+            <a:endParaRPr lang="en-US" sz="2400" dirty="0"/>
+          </a:p>
+          <a:p>
+            <a:pPr marL="342900" indent="-342900">
+              <a:buFont typeface="Arial" panose="020B0604020202020204" pitchFamily="34" charset="0"/>
+              <a:buChar char="•"/>
+            </a:pPr>
+            <a:r>
+              <a:rPr lang="en-US" sz="2400" dirty="0"/>
+              <a:t>They only show the savings for certain chosen basis sets, and cannot paint the whole picture</a:t>
+            </a:r>
+          </a:p>
+          <a:p>
+            <a:pPr marL="342900" indent="-342900">
+              <a:buFont typeface="Arial" panose="020B0604020202020204" pitchFamily="34" charset="0"/>
+              <a:buChar char="•"/>
+            </a:pPr>
+            <a:endParaRPr lang="en-US" sz="2400" dirty="0"/>
+          </a:p>
+          <a:p>
+            <a:pPr marL="342900" indent="-342900">
+              <a:buFont typeface="Arial" panose="020B0604020202020204" pitchFamily="34" charset="0"/>
+              <a:buChar char="•"/>
+            </a:pPr>
+            <a:endParaRPr lang="en-US" sz="2400" dirty="0"/>
+          </a:p>
+          <a:p>
+            <a:pPr marL="342900" indent="-342900">
+              <a:buFont typeface="Arial" panose="020B0604020202020204" pitchFamily="34" charset="0"/>
+              <a:buChar char="•"/>
+            </a:pPr>
+            <a:r>
+              <a:rPr lang="en-US" sz="2400" dirty="0"/>
+              <a:t>We can generate 2D plots to clearly show that the computational cost saving depends on basis set size</a:t>
+            </a:r>
+          </a:p>
+          <a:p>
+            <a:endParaRPr lang="en-US" dirty="0"/>
+          </a:p>
+          <a:p>
+            <a:endParaRPr lang="en-US" dirty="0"/>
+          </a:p>
+          <a:p>
+            <a:endParaRPr lang="en-US" dirty="0"/>
+          </a:p>
+          <a:p>
+            <a:br>
+              <a:rPr lang="en-US" dirty="0"/>
+            </a:br>
+            <a:endParaRPr lang="en-US" dirty="0"/>
+          </a:p>
+          <a:p>
+            <a:endParaRPr lang="en-US" dirty="0"/>
+          </a:p>
+          <a:p>
+            <a:endParaRPr lang="en-US" dirty="0"/>
+          </a:p>
+          <a:p>
+            <a:endParaRPr lang="en-US" dirty="0"/>
+          </a:p>
+          <a:p>
+            <a:endParaRPr lang="en-US" dirty="0"/>
+          </a:p>
+          <a:p>
+            <a:endParaRPr lang="en-US" dirty="0"/>
+          </a:p>
+          <a:p>
+            <a:endParaRPr lang="en-US" dirty="0"/>
+          </a:p>
+          <a:p>
+            <a:endParaRPr lang="en-US" dirty="0"/>
+          </a:p>
+          <a:p>
+            <a:endParaRPr lang="en-US" dirty="0"/>
+          </a:p>
+          <a:p>
+            <a:endParaRPr lang="en-US" dirty="0"/>
+          </a:p>
+          <a:p>
+            <a:endParaRPr lang="en-US" dirty="0"/>
+          </a:p>
+          <a:p>
+            <a:endParaRPr lang="en-US" dirty="0"/>
+          </a:p>
+          <a:p>
+            <a:endParaRPr lang="en-US" dirty="0"/>
+          </a:p>
+          <a:p>
+            <a:endParaRPr lang="en-US" dirty="0"/>
+          </a:p>
+          <a:p>
+            <a:endParaRPr lang="en-US" dirty="0"/>
+          </a:p>
+          <a:p>
+            <a:endParaRPr lang="en-US" dirty="0"/>
+          </a:p>
+          <a:p>
+            <a:endParaRPr lang="en-US" dirty="0"/>
+          </a:p>
+          <a:p>
+            <a:endParaRPr lang="en-US" dirty="0"/>
+          </a:p>
+        </p:txBody>
+      </p:sp>
+    </p:spTree>
+    <p:extLst>
+      <p:ext uri="{BB962C8B-B14F-4D97-AF65-F5344CB8AC3E}">
+        <p14:creationId xmlns:p14="http://schemas.microsoft.com/office/powerpoint/2010/main" val="3771266745"/>
+      </p:ext>
+    </p:extLst>
+  </p:cSld>
+  <p:clrMapOvr>
+    <a:masterClrMapping/>
+  </p:clrMapOvr>
+</p:sld>
+</file>
+
+<file path=ppt/slides/slide14.xml><?xml version="1.0" encoding="utf-8"?>
+<p:sld xmlns:a="http://schemas.openxmlformats.org/drawingml/2006/main" xmlns:r="http://schemas.openxmlformats.org/officeDocument/2006/relationships" xmlns:p="http://schemas.openxmlformats.org/presentationml/2006/main">
+  <p:cSld>
+    <p:spTree>
+      <p:nvGrpSpPr>
+        <p:cNvPr id="1" name=""/>
+        <p:cNvGrpSpPr/>
+        <p:nvPr/>
+      </p:nvGrpSpPr>
+      <p:grpSpPr>
+        <a:xfrm>
+          <a:off x="0" y="0"/>
+          <a:ext cx="0" cy="0"/>
+          <a:chOff x="0" y="0"/>
+          <a:chExt cx="0" cy="0"/>
+        </a:xfrm>
+      </p:grpSpPr>
+      <p:sp>
+        <p:nvSpPr>
+          <p:cNvPr id="2" name="Title 1">
+            <a:extLst>
+              <a:ext uri="{FF2B5EF4-FFF2-40B4-BE49-F238E27FC236}">
+                <a16:creationId xmlns:a16="http://schemas.microsoft.com/office/drawing/2014/main" id="{40BB8ABF-5C4A-7752-2282-C1E719C44441}"/>
+              </a:ext>
+            </a:extLst>
+          </p:cNvPr>
+          <p:cNvSpPr>
+            <a:spLocks noGrp="1"/>
+          </p:cNvSpPr>
+          <p:nvPr>
+            <p:ph type="title"/>
+          </p:nvPr>
+        </p:nvSpPr>
+        <p:spPr>
+          <a:xfrm>
+            <a:off x="339587" y="146464"/>
+            <a:ext cx="11512826" cy="1325563"/>
+          </a:xfrm>
+        </p:spPr>
+        <p:txBody>
+          <a:bodyPr/>
+          <a:lstStyle/>
+          <a:p>
+            <a:r>
+              <a:rPr lang="en-US" dirty="0"/>
+              <a:t>COH2 2D Plot</a:t>
+            </a:r>
+          </a:p>
+        </p:txBody>
+      </p:sp>
+      <p:pic>
+        <p:nvPicPr>
+          <p:cNvPr id="7" name="Picture 6">
+            <a:extLst>
+              <a:ext uri="{FF2B5EF4-FFF2-40B4-BE49-F238E27FC236}">
+                <a16:creationId xmlns:a16="http://schemas.microsoft.com/office/drawing/2014/main" id="{09565866-273F-1AC8-0480-AD5934E28797}"/>
+              </a:ext>
+            </a:extLst>
+          </p:cNvPr>
+          <p:cNvPicPr>
+            <a:picLocks noChangeAspect="1"/>
+          </p:cNvPicPr>
+          <p:nvPr/>
+        </p:nvPicPr>
+        <p:blipFill>
+          <a:blip r:embed="rId2"/>
+          <a:stretch>
+            <a:fillRect/>
+          </a:stretch>
+        </p:blipFill>
+        <p:spPr>
+          <a:xfrm>
+            <a:off x="6257094" y="809245"/>
+            <a:ext cx="5642380" cy="5642380"/>
+          </a:xfrm>
+          <a:prstGeom prst="rect">
+            <a:avLst/>
+          </a:prstGeom>
+        </p:spPr>
+      </p:pic>
+      <p:pic>
+        <p:nvPicPr>
+          <p:cNvPr id="12" name="Picture 11">
+            <a:extLst>
+              <a:ext uri="{FF2B5EF4-FFF2-40B4-BE49-F238E27FC236}">
+                <a16:creationId xmlns:a16="http://schemas.microsoft.com/office/drawing/2014/main" id="{08F6EF09-2318-9ADC-A5DE-8570CC4653C2}"/>
+              </a:ext>
+            </a:extLst>
+          </p:cNvPr>
+          <p:cNvPicPr>
+            <a:picLocks noChangeAspect="1"/>
+          </p:cNvPicPr>
+          <p:nvPr/>
+        </p:nvPicPr>
+        <p:blipFill>
+          <a:blip r:embed="rId3"/>
+          <a:stretch>
+            <a:fillRect/>
+          </a:stretch>
+        </p:blipFill>
+        <p:spPr>
+          <a:xfrm>
+            <a:off x="20365" y="1600902"/>
+            <a:ext cx="5926566" cy="4444924"/>
+          </a:xfrm>
+          <a:prstGeom prst="rect">
+            <a:avLst/>
+          </a:prstGeom>
+        </p:spPr>
+      </p:pic>
+      <p:sp>
+        <p:nvSpPr>
+          <p:cNvPr id="14" name="Donut 13">
+            <a:extLst>
+              <a:ext uri="{FF2B5EF4-FFF2-40B4-BE49-F238E27FC236}">
+                <a16:creationId xmlns:a16="http://schemas.microsoft.com/office/drawing/2014/main" id="{0D18FFE0-669C-29C2-245F-F07697E7B63A}"/>
+              </a:ext>
+            </a:extLst>
+          </p:cNvPr>
+          <p:cNvSpPr/>
+          <p:nvPr/>
+        </p:nvSpPr>
+        <p:spPr>
+          <a:xfrm>
+            <a:off x="1472859" y="5363662"/>
+            <a:ext cx="1037138" cy="682164"/>
+          </a:xfrm>
+          <a:prstGeom prst="donut">
+            <a:avLst/>
+          </a:prstGeom>
+          <a:noFill/>
+          <a:ln>
+            <a:noFill/>
+          </a:ln>
+        </p:spPr>
+        <p:style>
+          <a:lnRef idx="2">
+            <a:schemeClr val="accent1">
+              <a:shade val="50000"/>
+            </a:schemeClr>
+          </a:lnRef>
+          <a:fillRef idx="1">
+            <a:schemeClr val="accent1"/>
+          </a:fillRef>
+          <a:effectRef idx="0">
+            <a:schemeClr val="accent1"/>
+          </a:effectRef>
+          <a:fontRef idx="minor">
+            <a:schemeClr val="lt1"/>
+          </a:fontRef>
+        </p:style>
+        <p:txBody>
+          <a:bodyPr rtlCol="0" anchor="ctr"/>
+          <a:lstStyle/>
+          <a:p>
+            <a:pPr algn="ctr"/>
+            <a:endParaRPr lang="en-US">
+              <a:solidFill>
+                <a:schemeClr val="tx1"/>
+              </a:solidFill>
+            </a:endParaRPr>
+          </a:p>
+        </p:txBody>
+      </p:sp>
+      <p:sp>
+        <p:nvSpPr>
+          <p:cNvPr id="15" name="Oval 14">
+            <a:extLst>
+              <a:ext uri="{FF2B5EF4-FFF2-40B4-BE49-F238E27FC236}">
+                <a16:creationId xmlns:a16="http://schemas.microsoft.com/office/drawing/2014/main" id="{D6FCFD87-39D0-2BCE-E1A4-2F625614DCA7}"/>
+              </a:ext>
+            </a:extLst>
+          </p:cNvPr>
+          <p:cNvSpPr/>
+          <p:nvPr/>
+        </p:nvSpPr>
+        <p:spPr>
+          <a:xfrm>
+            <a:off x="1472860" y="5431168"/>
+            <a:ext cx="994180" cy="515501"/>
+          </a:xfrm>
+          <a:prstGeom prst="ellipse">
+            <a:avLst/>
+          </a:prstGeom>
+          <a:noFill/>
+          <a:ln>
+            <a:solidFill>
+              <a:schemeClr val="accent2"/>
+            </a:solidFill>
+          </a:ln>
+        </p:spPr>
+        <p:style>
+          <a:lnRef idx="2">
+            <a:schemeClr val="accent1">
+              <a:shade val="50000"/>
+            </a:schemeClr>
+          </a:lnRef>
+          <a:fillRef idx="1">
+            <a:schemeClr val="accent1"/>
+          </a:fillRef>
+          <a:effectRef idx="0">
+            <a:schemeClr val="accent1"/>
+          </a:effectRef>
+          <a:fontRef idx="minor">
+            <a:schemeClr val="lt1"/>
+          </a:fontRef>
+        </p:style>
+        <p:txBody>
+          <a:bodyPr rtlCol="0" anchor="ctr"/>
+          <a:lstStyle/>
+          <a:p>
+            <a:pPr algn="ctr"/>
+            <a:endParaRPr lang="en-US"/>
+          </a:p>
+        </p:txBody>
+      </p:sp>
+      <p:sp>
+        <p:nvSpPr>
+          <p:cNvPr id="19" name="Oval 18">
+            <a:extLst>
+              <a:ext uri="{FF2B5EF4-FFF2-40B4-BE49-F238E27FC236}">
+                <a16:creationId xmlns:a16="http://schemas.microsoft.com/office/drawing/2014/main" id="{8EC5879C-B7B4-FF5A-7936-E152FEB21FF8}"/>
+              </a:ext>
+            </a:extLst>
+          </p:cNvPr>
+          <p:cNvSpPr/>
+          <p:nvPr/>
+        </p:nvSpPr>
+        <p:spPr>
+          <a:xfrm>
+            <a:off x="2538767" y="5389232"/>
+            <a:ext cx="994180" cy="515501"/>
+          </a:xfrm>
+          <a:prstGeom prst="ellipse">
+            <a:avLst/>
+          </a:prstGeom>
+          <a:noFill/>
+          <a:ln>
+            <a:solidFill>
+              <a:schemeClr val="accent2"/>
+            </a:solidFill>
+          </a:ln>
+        </p:spPr>
+        <p:style>
+          <a:lnRef idx="2">
+            <a:schemeClr val="accent1">
+              <a:shade val="50000"/>
+            </a:schemeClr>
+          </a:lnRef>
+          <a:fillRef idx="1">
+            <a:schemeClr val="accent1"/>
+          </a:fillRef>
+          <a:effectRef idx="0">
+            <a:schemeClr val="accent1"/>
+          </a:effectRef>
+          <a:fontRef idx="minor">
+            <a:schemeClr val="lt1"/>
+          </a:fontRef>
+        </p:style>
+        <p:txBody>
+          <a:bodyPr rtlCol="0" anchor="ctr"/>
+          <a:lstStyle/>
+          <a:p>
+            <a:pPr algn="ctr"/>
+            <a:endParaRPr lang="en-US"/>
+          </a:p>
+        </p:txBody>
+      </p:sp>
+      <p:sp>
+        <p:nvSpPr>
+          <p:cNvPr id="20" name="Oval 19">
+            <a:extLst>
+              <a:ext uri="{FF2B5EF4-FFF2-40B4-BE49-F238E27FC236}">
+                <a16:creationId xmlns:a16="http://schemas.microsoft.com/office/drawing/2014/main" id="{D9A58D2B-742C-8253-3064-18CF097DBDC4}"/>
+              </a:ext>
+            </a:extLst>
+          </p:cNvPr>
+          <p:cNvSpPr/>
+          <p:nvPr/>
+        </p:nvSpPr>
+        <p:spPr>
+          <a:xfrm>
+            <a:off x="9623191" y="2479795"/>
+            <a:ext cx="385781" cy="682165"/>
+          </a:xfrm>
+          <a:prstGeom prst="ellipse">
+            <a:avLst/>
+          </a:prstGeom>
+          <a:noFill/>
+          <a:ln>
+            <a:solidFill>
+              <a:schemeClr val="accent2"/>
+            </a:solidFill>
+          </a:ln>
+        </p:spPr>
+        <p:style>
+          <a:lnRef idx="2">
+            <a:schemeClr val="accent1">
+              <a:shade val="50000"/>
+            </a:schemeClr>
+          </a:lnRef>
+          <a:fillRef idx="1">
+            <a:schemeClr val="accent1"/>
+          </a:fillRef>
+          <a:effectRef idx="0">
+            <a:schemeClr val="accent1"/>
+          </a:effectRef>
+          <a:fontRef idx="minor">
+            <a:schemeClr val="lt1"/>
+          </a:fontRef>
+        </p:style>
+        <p:txBody>
+          <a:bodyPr rtlCol="0" anchor="ctr"/>
+          <a:lstStyle/>
+          <a:p>
+            <a:pPr algn="ctr"/>
+            <a:endParaRPr lang="en-US"/>
+          </a:p>
+        </p:txBody>
+      </p:sp>
+      <p:sp>
+        <p:nvSpPr>
+          <p:cNvPr id="21" name="Oval 20">
+            <a:extLst>
+              <a:ext uri="{FF2B5EF4-FFF2-40B4-BE49-F238E27FC236}">
+                <a16:creationId xmlns:a16="http://schemas.microsoft.com/office/drawing/2014/main" id="{F90223EB-9453-B521-F190-75F0E388ACAC}"/>
+              </a:ext>
+            </a:extLst>
+          </p:cNvPr>
+          <p:cNvSpPr/>
+          <p:nvPr/>
+        </p:nvSpPr>
+        <p:spPr>
+          <a:xfrm>
+            <a:off x="401923" y="5389232"/>
+            <a:ext cx="994180" cy="515501"/>
+          </a:xfrm>
+          <a:prstGeom prst="ellipse">
+            <a:avLst/>
+          </a:prstGeom>
+          <a:noFill/>
+          <a:ln>
+            <a:solidFill>
+              <a:schemeClr val="accent2"/>
+            </a:solidFill>
+          </a:ln>
+        </p:spPr>
+        <p:style>
+          <a:lnRef idx="2">
+            <a:schemeClr val="accent1">
+              <a:shade val="50000"/>
+            </a:schemeClr>
+          </a:lnRef>
+          <a:fillRef idx="1">
+            <a:schemeClr val="accent1"/>
+          </a:fillRef>
+          <a:effectRef idx="0">
+            <a:schemeClr val="accent1"/>
+          </a:effectRef>
+          <a:fontRef idx="minor">
+            <a:schemeClr val="lt1"/>
+          </a:fontRef>
+        </p:style>
+        <p:txBody>
+          <a:bodyPr rtlCol="0" anchor="ctr"/>
+          <a:lstStyle/>
+          <a:p>
+            <a:pPr algn="ctr"/>
+            <a:endParaRPr lang="en-US"/>
+          </a:p>
+        </p:txBody>
+      </p:sp>
+      <p:sp>
+        <p:nvSpPr>
+          <p:cNvPr id="22" name="Oval 21">
+            <a:extLst>
+              <a:ext uri="{FF2B5EF4-FFF2-40B4-BE49-F238E27FC236}">
+                <a16:creationId xmlns:a16="http://schemas.microsoft.com/office/drawing/2014/main" id="{E9F88383-F4B6-82D8-E297-295A173C0C48}"/>
+              </a:ext>
+            </a:extLst>
+          </p:cNvPr>
+          <p:cNvSpPr/>
+          <p:nvPr/>
+        </p:nvSpPr>
+        <p:spPr>
+          <a:xfrm>
+            <a:off x="3634142" y="5389232"/>
+            <a:ext cx="994180" cy="515501"/>
+          </a:xfrm>
+          <a:prstGeom prst="ellipse">
+            <a:avLst/>
+          </a:prstGeom>
+          <a:noFill/>
+          <a:ln>
+            <a:solidFill>
+              <a:schemeClr val="accent2"/>
+            </a:solidFill>
+          </a:ln>
+        </p:spPr>
+        <p:style>
+          <a:lnRef idx="2">
+            <a:schemeClr val="accent1">
+              <a:shade val="50000"/>
+            </a:schemeClr>
+          </a:lnRef>
+          <a:fillRef idx="1">
+            <a:schemeClr val="accent1"/>
+          </a:fillRef>
+          <a:effectRef idx="0">
+            <a:schemeClr val="accent1"/>
+          </a:effectRef>
+          <a:fontRef idx="minor">
+            <a:schemeClr val="lt1"/>
+          </a:fontRef>
+        </p:style>
+        <p:txBody>
+          <a:bodyPr rtlCol="0" anchor="ctr"/>
+          <a:lstStyle/>
+          <a:p>
+            <a:pPr algn="ctr"/>
+            <a:endParaRPr lang="en-US"/>
+          </a:p>
+        </p:txBody>
+      </p:sp>
+      <p:sp>
+        <p:nvSpPr>
+          <p:cNvPr id="23" name="Oval 22">
+            <a:extLst>
+              <a:ext uri="{FF2B5EF4-FFF2-40B4-BE49-F238E27FC236}">
+                <a16:creationId xmlns:a16="http://schemas.microsoft.com/office/drawing/2014/main" id="{D7351DEF-8E6F-FE7D-B03E-74201189F414}"/>
+              </a:ext>
+            </a:extLst>
+          </p:cNvPr>
+          <p:cNvSpPr/>
+          <p:nvPr/>
+        </p:nvSpPr>
+        <p:spPr>
+          <a:xfrm>
+            <a:off x="9180310" y="2479794"/>
+            <a:ext cx="385781" cy="682165"/>
+          </a:xfrm>
+          <a:prstGeom prst="ellipse">
+            <a:avLst/>
+          </a:prstGeom>
+          <a:noFill/>
+          <a:ln>
+            <a:solidFill>
+              <a:schemeClr val="accent2"/>
+            </a:solidFill>
+          </a:ln>
+        </p:spPr>
+        <p:style>
+          <a:lnRef idx="2">
+            <a:schemeClr val="accent1">
+              <a:shade val="50000"/>
+            </a:schemeClr>
+          </a:lnRef>
+          <a:fillRef idx="1">
+            <a:schemeClr val="accent1"/>
+          </a:fillRef>
+          <a:effectRef idx="0">
+            <a:schemeClr val="accent1"/>
+          </a:effectRef>
+          <a:fontRef idx="minor">
+            <a:schemeClr val="lt1"/>
+          </a:fontRef>
+        </p:style>
+        <p:txBody>
+          <a:bodyPr rtlCol="0" anchor="ctr"/>
+          <a:lstStyle/>
+          <a:p>
+            <a:pPr algn="ctr"/>
+            <a:endParaRPr lang="en-US"/>
+          </a:p>
+        </p:txBody>
+      </p:sp>
+      <p:sp>
+        <p:nvSpPr>
+          <p:cNvPr id="24" name="Oval 23">
+            <a:extLst>
+              <a:ext uri="{FF2B5EF4-FFF2-40B4-BE49-F238E27FC236}">
+                <a16:creationId xmlns:a16="http://schemas.microsoft.com/office/drawing/2014/main" id="{30C7FB6A-9FF3-AE03-D088-1BEE6E18ADA1}"/>
+              </a:ext>
+            </a:extLst>
+          </p:cNvPr>
+          <p:cNvSpPr/>
+          <p:nvPr/>
+        </p:nvSpPr>
+        <p:spPr>
+          <a:xfrm>
+            <a:off x="9180310" y="4124626"/>
+            <a:ext cx="385781" cy="682165"/>
+          </a:xfrm>
+          <a:prstGeom prst="ellipse">
+            <a:avLst/>
+          </a:prstGeom>
+          <a:noFill/>
+          <a:ln>
+            <a:solidFill>
+              <a:schemeClr val="accent2"/>
+            </a:solidFill>
+          </a:ln>
+        </p:spPr>
+        <p:style>
+          <a:lnRef idx="2">
+            <a:schemeClr val="accent1">
+              <a:shade val="50000"/>
+            </a:schemeClr>
+          </a:lnRef>
+          <a:fillRef idx="1">
+            <a:schemeClr val="accent1"/>
+          </a:fillRef>
+          <a:effectRef idx="0">
+            <a:schemeClr val="accent1"/>
+          </a:effectRef>
+          <a:fontRef idx="minor">
+            <a:schemeClr val="lt1"/>
+          </a:fontRef>
+        </p:style>
+        <p:txBody>
+          <a:bodyPr rtlCol="0" anchor="ctr"/>
+          <a:lstStyle/>
+          <a:p>
+            <a:pPr algn="ctr"/>
+            <a:endParaRPr lang="en-US"/>
+          </a:p>
+        </p:txBody>
+      </p:sp>
+      <p:sp>
+        <p:nvSpPr>
+          <p:cNvPr id="25" name="Oval 24">
+            <a:extLst>
+              <a:ext uri="{FF2B5EF4-FFF2-40B4-BE49-F238E27FC236}">
+                <a16:creationId xmlns:a16="http://schemas.microsoft.com/office/drawing/2014/main" id="{1A4F2D5E-41D5-B727-D8EE-36E0B30F21AD}"/>
+              </a:ext>
+            </a:extLst>
+          </p:cNvPr>
+          <p:cNvSpPr/>
+          <p:nvPr/>
+        </p:nvSpPr>
+        <p:spPr>
+          <a:xfrm>
+            <a:off x="9180309" y="4983654"/>
+            <a:ext cx="385781" cy="682165"/>
+          </a:xfrm>
+          <a:prstGeom prst="ellipse">
+            <a:avLst/>
+          </a:prstGeom>
+          <a:noFill/>
+          <a:ln>
+            <a:solidFill>
+              <a:schemeClr val="accent2"/>
+            </a:solidFill>
+          </a:ln>
+        </p:spPr>
+        <p:style>
+          <a:lnRef idx="2">
+            <a:schemeClr val="accent1">
+              <a:shade val="50000"/>
+            </a:schemeClr>
+          </a:lnRef>
+          <a:fillRef idx="1">
+            <a:schemeClr val="accent1"/>
+          </a:fillRef>
+          <a:effectRef idx="0">
+            <a:schemeClr val="accent1"/>
+          </a:effectRef>
+          <a:fontRef idx="minor">
+            <a:schemeClr val="lt1"/>
+          </a:fontRef>
+        </p:style>
+        <p:txBody>
+          <a:bodyPr rtlCol="0" anchor="ctr"/>
+          <a:lstStyle/>
+          <a:p>
+            <a:pPr algn="ctr"/>
+            <a:endParaRPr lang="en-US"/>
+          </a:p>
+        </p:txBody>
+      </p:sp>
+      <p:sp>
+        <p:nvSpPr>
+          <p:cNvPr id="26" name="TextBox 25">
+            <a:extLst>
+              <a:ext uri="{FF2B5EF4-FFF2-40B4-BE49-F238E27FC236}">
+                <a16:creationId xmlns:a16="http://schemas.microsoft.com/office/drawing/2014/main" id="{71F7F12D-3FA7-032D-451D-55F12347DC2B}"/>
+              </a:ext>
+            </a:extLst>
+          </p:cNvPr>
+          <p:cNvSpPr txBox="1"/>
+          <p:nvPr/>
+        </p:nvSpPr>
+        <p:spPr>
+          <a:xfrm>
+            <a:off x="4740982" y="1006461"/>
+            <a:ext cx="4809650" cy="369332"/>
+          </a:xfrm>
+          <a:prstGeom prst="rect">
+            <a:avLst/>
+          </a:prstGeom>
+          <a:noFill/>
+        </p:spPr>
+        <p:txBody>
+          <a:bodyPr wrap="none" rtlCol="0">
+            <a:spAutoFit/>
+          </a:bodyPr>
+          <a:lstStyle/>
+          <a:p>
+            <a:r>
+              <a:rPr lang="en-US" dirty="0"/>
+              <a:t>Previously we were only showing the circle data.</a:t>
+            </a:r>
+          </a:p>
+        </p:txBody>
+      </p:sp>
+    </p:spTree>
+    <p:extLst>
+      <p:ext uri="{BB962C8B-B14F-4D97-AF65-F5344CB8AC3E}">
+        <p14:creationId xmlns:p14="http://schemas.microsoft.com/office/powerpoint/2010/main" val="2667393937"/>
+      </p:ext>
+    </p:extLst>
+  </p:cSld>
+  <p:clrMapOvr>
+    <a:masterClrMapping/>
+  </p:clrMapOvr>
+</p:sld>
+</file>
+
+<file path=ppt/slides/slide15.xml><?xml version="1.0" encoding="utf-8"?>
+<p:sld xmlns:a="http://schemas.openxmlformats.org/drawingml/2006/main" xmlns:r="http://schemas.openxmlformats.org/officeDocument/2006/relationships" xmlns:p="http://schemas.openxmlformats.org/presentationml/2006/main">
+  <p:cSld>
+    <p:spTree>
+      <p:nvGrpSpPr>
+        <p:cNvPr id="1" name=""/>
+        <p:cNvGrpSpPr/>
+        <p:nvPr/>
+      </p:nvGrpSpPr>
+      <p:grpSpPr>
+        <a:xfrm>
+          <a:off x="0" y="0"/>
+          <a:ext cx="0" cy="0"/>
+          <a:chOff x="0" y="0"/>
+          <a:chExt cx="0" cy="0"/>
+        </a:xfrm>
+      </p:grpSpPr>
+      <p:pic>
+        <p:nvPicPr>
+          <p:cNvPr id="4" name="Picture 3">
+            <a:extLst>
+              <a:ext uri="{FF2B5EF4-FFF2-40B4-BE49-F238E27FC236}">
+                <a16:creationId xmlns:a16="http://schemas.microsoft.com/office/drawing/2014/main" id="{3DA4DD83-1D64-D156-DA91-143C9391BB12}"/>
+              </a:ext>
+            </a:extLst>
+          </p:cNvPr>
+          <p:cNvPicPr>
+            <a:picLocks noChangeAspect="1"/>
+          </p:cNvPicPr>
+          <p:nvPr/>
+        </p:nvPicPr>
+        <p:blipFill>
+          <a:blip r:embed="rId2"/>
+          <a:stretch>
+            <a:fillRect/>
+          </a:stretch>
+        </p:blipFill>
+        <p:spPr>
+          <a:xfrm>
+            <a:off x="5975569" y="103014"/>
+            <a:ext cx="6858000" cy="6858000"/>
+          </a:xfrm>
+          <a:prstGeom prst="rect">
+            <a:avLst/>
+          </a:prstGeom>
+        </p:spPr>
+      </p:pic>
+      <p:sp>
+        <p:nvSpPr>
+          <p:cNvPr id="2" name="Title 1">
+            <a:extLst>
+              <a:ext uri="{FF2B5EF4-FFF2-40B4-BE49-F238E27FC236}">
+                <a16:creationId xmlns:a16="http://schemas.microsoft.com/office/drawing/2014/main" id="{40BB8ABF-5C4A-7752-2282-C1E719C44441}"/>
+              </a:ext>
+            </a:extLst>
+          </p:cNvPr>
+          <p:cNvSpPr>
+            <a:spLocks noGrp="1"/>
+          </p:cNvSpPr>
+          <p:nvPr>
+            <p:ph type="title"/>
+          </p:nvPr>
+        </p:nvSpPr>
+        <p:spPr>
+          <a:xfrm>
+            <a:off x="339587" y="146464"/>
+            <a:ext cx="11512826" cy="1325563"/>
+          </a:xfrm>
+        </p:spPr>
+        <p:txBody>
+          <a:bodyPr/>
+          <a:lstStyle/>
+          <a:p>
+            <a:r>
+              <a:rPr lang="en-US" dirty="0"/>
+              <a:t>HCN 2D Plot</a:t>
+            </a:r>
+          </a:p>
+        </p:txBody>
+      </p:sp>
+      <p:pic>
+        <p:nvPicPr>
+          <p:cNvPr id="12" name="Picture 11">
+            <a:extLst>
+              <a:ext uri="{FF2B5EF4-FFF2-40B4-BE49-F238E27FC236}">
+                <a16:creationId xmlns:a16="http://schemas.microsoft.com/office/drawing/2014/main" id="{08F6EF09-2318-9ADC-A5DE-8570CC4653C2}"/>
+              </a:ext>
+            </a:extLst>
+          </p:cNvPr>
+          <p:cNvPicPr>
+            <a:picLocks noChangeAspect="1"/>
+          </p:cNvPicPr>
+          <p:nvPr/>
+        </p:nvPicPr>
+        <p:blipFill>
+          <a:blip r:embed="rId3"/>
+          <a:stretch>
+            <a:fillRect/>
+          </a:stretch>
+        </p:blipFill>
+        <p:spPr>
+          <a:xfrm>
+            <a:off x="20365" y="1600902"/>
+            <a:ext cx="5926566" cy="4444924"/>
+          </a:xfrm>
+          <a:prstGeom prst="rect">
+            <a:avLst/>
+          </a:prstGeom>
+        </p:spPr>
+      </p:pic>
+      <p:sp>
+        <p:nvSpPr>
+          <p:cNvPr id="14" name="Donut 13">
+            <a:extLst>
+              <a:ext uri="{FF2B5EF4-FFF2-40B4-BE49-F238E27FC236}">
+                <a16:creationId xmlns:a16="http://schemas.microsoft.com/office/drawing/2014/main" id="{0D18FFE0-669C-29C2-245F-F07697E7B63A}"/>
+              </a:ext>
+            </a:extLst>
+          </p:cNvPr>
+          <p:cNvSpPr/>
+          <p:nvPr/>
+        </p:nvSpPr>
+        <p:spPr>
+          <a:xfrm>
+            <a:off x="1472859" y="5363662"/>
+            <a:ext cx="1037138" cy="682164"/>
+          </a:xfrm>
+          <a:prstGeom prst="donut">
+            <a:avLst/>
+          </a:prstGeom>
+          <a:noFill/>
+          <a:ln>
+            <a:noFill/>
+          </a:ln>
+        </p:spPr>
+        <p:style>
+          <a:lnRef idx="2">
+            <a:schemeClr val="accent1">
+              <a:shade val="50000"/>
+            </a:schemeClr>
+          </a:lnRef>
+          <a:fillRef idx="1">
+            <a:schemeClr val="accent1"/>
+          </a:fillRef>
+          <a:effectRef idx="0">
+            <a:schemeClr val="accent1"/>
+          </a:effectRef>
+          <a:fontRef idx="minor">
+            <a:schemeClr val="lt1"/>
+          </a:fontRef>
+        </p:style>
+        <p:txBody>
+          <a:bodyPr rtlCol="0" anchor="ctr"/>
+          <a:lstStyle/>
+          <a:p>
+            <a:pPr algn="ctr"/>
+            <a:endParaRPr lang="en-US">
+              <a:solidFill>
+                <a:schemeClr val="tx1"/>
+              </a:solidFill>
+            </a:endParaRPr>
+          </a:p>
+        </p:txBody>
+      </p:sp>
+      <p:sp>
+        <p:nvSpPr>
+          <p:cNvPr id="15" name="Oval 14">
+            <a:extLst>
+              <a:ext uri="{FF2B5EF4-FFF2-40B4-BE49-F238E27FC236}">
+                <a16:creationId xmlns:a16="http://schemas.microsoft.com/office/drawing/2014/main" id="{D6FCFD87-39D0-2BCE-E1A4-2F625614DCA7}"/>
+              </a:ext>
+            </a:extLst>
+          </p:cNvPr>
+          <p:cNvSpPr/>
+          <p:nvPr/>
+        </p:nvSpPr>
+        <p:spPr>
+          <a:xfrm>
+            <a:off x="1472860" y="5431168"/>
+            <a:ext cx="994180" cy="515501"/>
+          </a:xfrm>
+          <a:prstGeom prst="ellipse">
+            <a:avLst/>
+          </a:prstGeom>
+          <a:noFill/>
+          <a:ln>
+            <a:solidFill>
+              <a:schemeClr val="accent2"/>
+            </a:solidFill>
+          </a:ln>
+        </p:spPr>
+        <p:style>
+          <a:lnRef idx="2">
+            <a:schemeClr val="accent1">
+              <a:shade val="50000"/>
+            </a:schemeClr>
+          </a:lnRef>
+          <a:fillRef idx="1">
+            <a:schemeClr val="accent1"/>
+          </a:fillRef>
+          <a:effectRef idx="0">
+            <a:schemeClr val="accent1"/>
+          </a:effectRef>
+          <a:fontRef idx="minor">
+            <a:schemeClr val="lt1"/>
+          </a:fontRef>
+        </p:style>
+        <p:txBody>
+          <a:bodyPr rtlCol="0" anchor="ctr"/>
+          <a:lstStyle/>
+          <a:p>
+            <a:pPr algn="ctr"/>
+            <a:endParaRPr lang="en-US"/>
+          </a:p>
+        </p:txBody>
+      </p:sp>
+      <p:sp>
+        <p:nvSpPr>
+          <p:cNvPr id="19" name="Oval 18">
+            <a:extLst>
+              <a:ext uri="{FF2B5EF4-FFF2-40B4-BE49-F238E27FC236}">
+                <a16:creationId xmlns:a16="http://schemas.microsoft.com/office/drawing/2014/main" id="{8EC5879C-B7B4-FF5A-7936-E152FEB21FF8}"/>
+              </a:ext>
+            </a:extLst>
+          </p:cNvPr>
+          <p:cNvSpPr/>
+          <p:nvPr/>
+        </p:nvSpPr>
+        <p:spPr>
+          <a:xfrm>
+            <a:off x="2538767" y="5389232"/>
+            <a:ext cx="994180" cy="515501"/>
+          </a:xfrm>
+          <a:prstGeom prst="ellipse">
+            <a:avLst/>
+          </a:prstGeom>
+          <a:noFill/>
+          <a:ln>
+            <a:solidFill>
+              <a:schemeClr val="accent2"/>
+            </a:solidFill>
+          </a:ln>
+        </p:spPr>
+        <p:style>
+          <a:lnRef idx="2">
+            <a:schemeClr val="accent1">
+              <a:shade val="50000"/>
+            </a:schemeClr>
+          </a:lnRef>
+          <a:fillRef idx="1">
+            <a:schemeClr val="accent1"/>
+          </a:fillRef>
+          <a:effectRef idx="0">
+            <a:schemeClr val="accent1"/>
+          </a:effectRef>
+          <a:fontRef idx="minor">
+            <a:schemeClr val="lt1"/>
+          </a:fontRef>
+        </p:style>
+        <p:txBody>
+          <a:bodyPr rtlCol="0" anchor="ctr"/>
+          <a:lstStyle/>
+          <a:p>
+            <a:pPr algn="ctr"/>
+            <a:endParaRPr lang="en-US"/>
+          </a:p>
+        </p:txBody>
+      </p:sp>
+      <p:sp>
+        <p:nvSpPr>
+          <p:cNvPr id="20" name="Oval 19">
+            <a:extLst>
+              <a:ext uri="{FF2B5EF4-FFF2-40B4-BE49-F238E27FC236}">
+                <a16:creationId xmlns:a16="http://schemas.microsoft.com/office/drawing/2014/main" id="{D9A58D2B-742C-8253-3064-18CF097DBDC4}"/>
+              </a:ext>
+            </a:extLst>
+          </p:cNvPr>
+          <p:cNvSpPr/>
+          <p:nvPr/>
+        </p:nvSpPr>
+        <p:spPr>
+          <a:xfrm>
+            <a:off x="9577451" y="4225000"/>
+            <a:ext cx="385781" cy="682165"/>
+          </a:xfrm>
+          <a:prstGeom prst="ellipse">
+            <a:avLst/>
+          </a:prstGeom>
+          <a:noFill/>
+          <a:ln>
+            <a:solidFill>
+              <a:schemeClr val="accent2"/>
+            </a:solidFill>
+          </a:ln>
+        </p:spPr>
+        <p:style>
+          <a:lnRef idx="2">
+            <a:schemeClr val="accent1">
+              <a:shade val="50000"/>
+            </a:schemeClr>
+          </a:lnRef>
+          <a:fillRef idx="1">
+            <a:schemeClr val="accent1"/>
+          </a:fillRef>
+          <a:effectRef idx="0">
+            <a:schemeClr val="accent1"/>
+          </a:effectRef>
+          <a:fontRef idx="minor">
+            <a:schemeClr val="lt1"/>
+          </a:fontRef>
+        </p:style>
+        <p:txBody>
+          <a:bodyPr rtlCol="0" anchor="ctr"/>
+          <a:lstStyle/>
+          <a:p>
+            <a:pPr algn="ctr"/>
+            <a:endParaRPr lang="en-US"/>
+          </a:p>
+        </p:txBody>
+      </p:sp>
+      <p:sp>
+        <p:nvSpPr>
+          <p:cNvPr id="21" name="Oval 20">
+            <a:extLst>
+              <a:ext uri="{FF2B5EF4-FFF2-40B4-BE49-F238E27FC236}">
+                <a16:creationId xmlns:a16="http://schemas.microsoft.com/office/drawing/2014/main" id="{F90223EB-9453-B521-F190-75F0E388ACAC}"/>
+              </a:ext>
+            </a:extLst>
+          </p:cNvPr>
+          <p:cNvSpPr/>
+          <p:nvPr/>
+        </p:nvSpPr>
+        <p:spPr>
+          <a:xfrm>
+            <a:off x="401923" y="5389232"/>
+            <a:ext cx="994180" cy="515501"/>
+          </a:xfrm>
+          <a:prstGeom prst="ellipse">
+            <a:avLst/>
+          </a:prstGeom>
+          <a:noFill/>
+          <a:ln>
+            <a:solidFill>
+              <a:schemeClr val="accent2"/>
+            </a:solidFill>
+          </a:ln>
+        </p:spPr>
+        <p:style>
+          <a:lnRef idx="2">
+            <a:schemeClr val="accent1">
+              <a:shade val="50000"/>
+            </a:schemeClr>
+          </a:lnRef>
+          <a:fillRef idx="1">
+            <a:schemeClr val="accent1"/>
+          </a:fillRef>
+          <a:effectRef idx="0">
+            <a:schemeClr val="accent1"/>
+          </a:effectRef>
+          <a:fontRef idx="minor">
+            <a:schemeClr val="lt1"/>
+          </a:fontRef>
+        </p:style>
+        <p:txBody>
+          <a:bodyPr rtlCol="0" anchor="ctr"/>
+          <a:lstStyle/>
+          <a:p>
+            <a:pPr algn="ctr"/>
+            <a:endParaRPr lang="en-US"/>
+          </a:p>
+        </p:txBody>
+      </p:sp>
+      <p:sp>
+        <p:nvSpPr>
+          <p:cNvPr id="22" name="Oval 21">
+            <a:extLst>
+              <a:ext uri="{FF2B5EF4-FFF2-40B4-BE49-F238E27FC236}">
+                <a16:creationId xmlns:a16="http://schemas.microsoft.com/office/drawing/2014/main" id="{E9F88383-F4B6-82D8-E297-295A173C0C48}"/>
+              </a:ext>
+            </a:extLst>
+          </p:cNvPr>
+          <p:cNvSpPr/>
+          <p:nvPr/>
+        </p:nvSpPr>
+        <p:spPr>
+          <a:xfrm>
+            <a:off x="3634142" y="5389232"/>
+            <a:ext cx="994180" cy="515501"/>
+          </a:xfrm>
+          <a:prstGeom prst="ellipse">
+            <a:avLst/>
+          </a:prstGeom>
+          <a:noFill/>
+          <a:ln>
+            <a:solidFill>
+              <a:schemeClr val="accent2"/>
+            </a:solidFill>
+          </a:ln>
+        </p:spPr>
+        <p:style>
+          <a:lnRef idx="2">
+            <a:schemeClr val="accent1">
+              <a:shade val="50000"/>
+            </a:schemeClr>
+          </a:lnRef>
+          <a:fillRef idx="1">
+            <a:schemeClr val="accent1"/>
+          </a:fillRef>
+          <a:effectRef idx="0">
+            <a:schemeClr val="accent1"/>
+          </a:effectRef>
+          <a:fontRef idx="minor">
+            <a:schemeClr val="lt1"/>
+          </a:fontRef>
+        </p:style>
+        <p:txBody>
+          <a:bodyPr rtlCol="0" anchor="ctr"/>
+          <a:lstStyle/>
+          <a:p>
+            <a:pPr algn="ctr"/>
+            <a:endParaRPr lang="en-US"/>
+          </a:p>
+        </p:txBody>
+      </p:sp>
+      <p:sp>
+        <p:nvSpPr>
+          <p:cNvPr id="23" name="Oval 22">
+            <a:extLst>
+              <a:ext uri="{FF2B5EF4-FFF2-40B4-BE49-F238E27FC236}">
+                <a16:creationId xmlns:a16="http://schemas.microsoft.com/office/drawing/2014/main" id="{D7351DEF-8E6F-FE7D-B03E-74201189F414}"/>
+              </a:ext>
+            </a:extLst>
+          </p:cNvPr>
+          <p:cNvSpPr/>
+          <p:nvPr/>
+        </p:nvSpPr>
+        <p:spPr>
+          <a:xfrm>
+            <a:off x="10110370" y="2171153"/>
+            <a:ext cx="385781" cy="682165"/>
+          </a:xfrm>
+          <a:prstGeom prst="ellipse">
+            <a:avLst/>
+          </a:prstGeom>
+          <a:noFill/>
+          <a:ln>
+            <a:solidFill>
+              <a:schemeClr val="accent2"/>
+            </a:solidFill>
+          </a:ln>
+        </p:spPr>
+        <p:style>
+          <a:lnRef idx="2">
+            <a:schemeClr val="accent1">
+              <a:shade val="50000"/>
+            </a:schemeClr>
+          </a:lnRef>
+          <a:fillRef idx="1">
+            <a:schemeClr val="accent1"/>
+          </a:fillRef>
+          <a:effectRef idx="0">
+            <a:schemeClr val="accent1"/>
+          </a:effectRef>
+          <a:fontRef idx="minor">
+            <a:schemeClr val="lt1"/>
+          </a:fontRef>
+        </p:style>
+        <p:txBody>
+          <a:bodyPr rtlCol="0" anchor="ctr"/>
+          <a:lstStyle/>
+          <a:p>
+            <a:pPr algn="ctr"/>
+            <a:endParaRPr lang="en-US"/>
+          </a:p>
+        </p:txBody>
+      </p:sp>
+      <p:sp>
+        <p:nvSpPr>
+          <p:cNvPr id="24" name="Oval 23">
+            <a:extLst>
+              <a:ext uri="{FF2B5EF4-FFF2-40B4-BE49-F238E27FC236}">
+                <a16:creationId xmlns:a16="http://schemas.microsoft.com/office/drawing/2014/main" id="{30C7FB6A-9FF3-AE03-D088-1BEE6E18ADA1}"/>
+              </a:ext>
+            </a:extLst>
+          </p:cNvPr>
+          <p:cNvSpPr/>
+          <p:nvPr/>
+        </p:nvSpPr>
+        <p:spPr>
+          <a:xfrm>
+            <a:off x="9577451" y="5306635"/>
+            <a:ext cx="385781" cy="682165"/>
+          </a:xfrm>
+          <a:prstGeom prst="ellipse">
+            <a:avLst/>
+          </a:prstGeom>
+          <a:noFill/>
+          <a:ln>
+            <a:solidFill>
+              <a:schemeClr val="accent2"/>
+            </a:solidFill>
+          </a:ln>
+        </p:spPr>
+        <p:style>
+          <a:lnRef idx="2">
+            <a:schemeClr val="accent1">
+              <a:shade val="50000"/>
+            </a:schemeClr>
+          </a:lnRef>
+          <a:fillRef idx="1">
+            <a:schemeClr val="accent1"/>
+          </a:fillRef>
+          <a:effectRef idx="0">
+            <a:schemeClr val="accent1"/>
+          </a:effectRef>
+          <a:fontRef idx="minor">
+            <a:schemeClr val="lt1"/>
+          </a:fontRef>
+        </p:style>
+        <p:txBody>
+          <a:bodyPr rtlCol="0" anchor="ctr"/>
+          <a:lstStyle/>
+          <a:p>
+            <a:pPr algn="ctr"/>
+            <a:endParaRPr lang="en-US"/>
+          </a:p>
+        </p:txBody>
+      </p:sp>
+      <p:sp>
+        <p:nvSpPr>
+          <p:cNvPr id="25" name="Oval 24">
+            <a:extLst>
+              <a:ext uri="{FF2B5EF4-FFF2-40B4-BE49-F238E27FC236}">
+                <a16:creationId xmlns:a16="http://schemas.microsoft.com/office/drawing/2014/main" id="{1A4F2D5E-41D5-B727-D8EE-36E0B30F21AD}"/>
+              </a:ext>
+            </a:extLst>
+          </p:cNvPr>
+          <p:cNvSpPr/>
+          <p:nvPr/>
+        </p:nvSpPr>
+        <p:spPr>
+          <a:xfrm>
+            <a:off x="9577452" y="2171153"/>
+            <a:ext cx="385781" cy="682165"/>
+          </a:xfrm>
+          <a:prstGeom prst="ellipse">
+            <a:avLst/>
+          </a:prstGeom>
+          <a:noFill/>
+          <a:ln>
+            <a:solidFill>
+              <a:schemeClr val="accent2"/>
+            </a:solidFill>
+          </a:ln>
+        </p:spPr>
+        <p:style>
+          <a:lnRef idx="2">
+            <a:schemeClr val="accent1">
+              <a:shade val="50000"/>
+            </a:schemeClr>
+          </a:lnRef>
+          <a:fillRef idx="1">
+            <a:schemeClr val="accent1"/>
+          </a:fillRef>
+          <a:effectRef idx="0">
+            <a:schemeClr val="accent1"/>
+          </a:effectRef>
+          <a:fontRef idx="minor">
+            <a:schemeClr val="lt1"/>
+          </a:fontRef>
+        </p:style>
+        <p:txBody>
+          <a:bodyPr rtlCol="0" anchor="ctr"/>
+          <a:lstStyle/>
+          <a:p>
+            <a:pPr algn="ctr"/>
+            <a:endParaRPr lang="en-US"/>
+          </a:p>
+        </p:txBody>
+      </p:sp>
+    </p:spTree>
+    <p:extLst>
+      <p:ext uri="{BB962C8B-B14F-4D97-AF65-F5344CB8AC3E}">
+        <p14:creationId xmlns:p14="http://schemas.microsoft.com/office/powerpoint/2010/main" val="1959638639"/>
+      </p:ext>
+    </p:extLst>
+  </p:cSld>
+  <p:clrMapOvr>
+    <a:masterClrMapping/>
+  </p:clrMapOvr>
+</p:sld>
+</file>
+
+<file path=ppt/slides/slide16.xml><?xml version="1.0" encoding="utf-8"?>
+<p:sld xmlns:a="http://schemas.openxmlformats.org/drawingml/2006/main" xmlns:r="http://schemas.openxmlformats.org/officeDocument/2006/relationships" xmlns:p="http://schemas.openxmlformats.org/presentationml/2006/main">
+  <p:cSld>
+    <p:spTree>
+      <p:nvGrpSpPr>
+        <p:cNvPr id="1" name=""/>
+        <p:cNvGrpSpPr/>
+        <p:nvPr/>
+      </p:nvGrpSpPr>
+      <p:grpSpPr>
+        <a:xfrm>
+          <a:off x="0" y="0"/>
+          <a:ext cx="0" cy="0"/>
+          <a:chOff x="0" y="0"/>
+          <a:chExt cx="0" cy="0"/>
+        </a:xfrm>
+      </p:grpSpPr>
+      <p:sp>
+        <p:nvSpPr>
+          <p:cNvPr id="2" name="Title 1">
+            <a:extLst>
+              <a:ext uri="{FF2B5EF4-FFF2-40B4-BE49-F238E27FC236}">
+                <a16:creationId xmlns:a16="http://schemas.microsoft.com/office/drawing/2014/main" id="{40BB8ABF-5C4A-7752-2282-C1E719C44441}"/>
+              </a:ext>
+            </a:extLst>
+          </p:cNvPr>
+          <p:cNvSpPr>
+            <a:spLocks noGrp="1"/>
+          </p:cNvSpPr>
+          <p:nvPr>
+            <p:ph type="title"/>
+          </p:nvPr>
+        </p:nvSpPr>
+        <p:spPr>
+          <a:xfrm>
+            <a:off x="339587" y="146464"/>
+            <a:ext cx="11512826" cy="1325563"/>
+          </a:xfrm>
+        </p:spPr>
+        <p:txBody>
+          <a:bodyPr/>
+          <a:lstStyle/>
+          <a:p>
+            <a:r>
+              <a:rPr lang="en-US" dirty="0"/>
+              <a:t>4H2O+ 2D plot</a:t>
+            </a:r>
+          </a:p>
+        </p:txBody>
+      </p:sp>
+      <p:pic>
+        <p:nvPicPr>
+          <p:cNvPr id="18" name="Picture 17">
+            <a:extLst>
+              <a:ext uri="{FF2B5EF4-FFF2-40B4-BE49-F238E27FC236}">
+                <a16:creationId xmlns:a16="http://schemas.microsoft.com/office/drawing/2014/main" id="{4EADCA10-AE0A-5176-8E19-EE6F5AAFF74F}"/>
+              </a:ext>
+            </a:extLst>
+          </p:cNvPr>
+          <p:cNvPicPr>
+            <a:picLocks noChangeAspect="1"/>
+          </p:cNvPicPr>
+          <p:nvPr/>
+        </p:nvPicPr>
+        <p:blipFill>
+          <a:blip r:embed="rId2"/>
+          <a:stretch>
+            <a:fillRect/>
+          </a:stretch>
+        </p:blipFill>
+        <p:spPr>
+          <a:xfrm>
+            <a:off x="-63926" y="2563695"/>
+            <a:ext cx="3393712" cy="3393712"/>
+          </a:xfrm>
+          <a:prstGeom prst="rect">
+            <a:avLst/>
+          </a:prstGeom>
+        </p:spPr>
+      </p:pic>
+      <p:pic>
+        <p:nvPicPr>
+          <p:cNvPr id="27" name="Picture 26">
+            <a:extLst>
+              <a:ext uri="{FF2B5EF4-FFF2-40B4-BE49-F238E27FC236}">
+                <a16:creationId xmlns:a16="http://schemas.microsoft.com/office/drawing/2014/main" id="{ADE3AACA-5A9D-1CCC-4325-D0F246434611}"/>
+              </a:ext>
+            </a:extLst>
+          </p:cNvPr>
+          <p:cNvPicPr>
+            <a:picLocks noChangeAspect="1"/>
+          </p:cNvPicPr>
+          <p:nvPr/>
+        </p:nvPicPr>
+        <p:blipFill>
+          <a:blip r:embed="rId3"/>
+          <a:stretch>
+            <a:fillRect/>
+          </a:stretch>
+        </p:blipFill>
+        <p:spPr>
+          <a:xfrm>
+            <a:off x="2822469" y="2563697"/>
+            <a:ext cx="3393710" cy="3393710"/>
+          </a:xfrm>
+          <a:prstGeom prst="rect">
+            <a:avLst/>
+          </a:prstGeom>
+        </p:spPr>
+      </p:pic>
+      <p:pic>
+        <p:nvPicPr>
+          <p:cNvPr id="29" name="Picture 28">
+            <a:extLst>
+              <a:ext uri="{FF2B5EF4-FFF2-40B4-BE49-F238E27FC236}">
+                <a16:creationId xmlns:a16="http://schemas.microsoft.com/office/drawing/2014/main" id="{BB376440-4831-7401-C7B5-DBB7FCF6E54F}"/>
+              </a:ext>
+            </a:extLst>
+          </p:cNvPr>
+          <p:cNvPicPr>
+            <a:picLocks noChangeAspect="1"/>
+          </p:cNvPicPr>
+          <p:nvPr/>
+        </p:nvPicPr>
+        <p:blipFill>
+          <a:blip r:embed="rId4"/>
+          <a:stretch>
+            <a:fillRect/>
+          </a:stretch>
+        </p:blipFill>
+        <p:spPr>
+          <a:xfrm>
+            <a:off x="5889390" y="2527387"/>
+            <a:ext cx="3393711" cy="3393711"/>
+          </a:xfrm>
+          <a:prstGeom prst="rect">
+            <a:avLst/>
+          </a:prstGeom>
+        </p:spPr>
+      </p:pic>
+      <p:pic>
+        <p:nvPicPr>
+          <p:cNvPr id="31" name="Picture 30">
+            <a:extLst>
+              <a:ext uri="{FF2B5EF4-FFF2-40B4-BE49-F238E27FC236}">
+                <a16:creationId xmlns:a16="http://schemas.microsoft.com/office/drawing/2014/main" id="{58522D1C-B3C5-D230-5B3C-0227D032FC4E}"/>
+              </a:ext>
+            </a:extLst>
+          </p:cNvPr>
+          <p:cNvPicPr>
+            <a:picLocks noChangeAspect="1"/>
+          </p:cNvPicPr>
+          <p:nvPr/>
+        </p:nvPicPr>
+        <p:blipFill>
+          <a:blip r:embed="rId5"/>
+          <a:stretch>
+            <a:fillRect/>
+          </a:stretch>
+        </p:blipFill>
+        <p:spPr>
+          <a:xfrm>
+            <a:off x="8944039" y="2527387"/>
+            <a:ext cx="3393710" cy="3393710"/>
+          </a:xfrm>
+          <a:prstGeom prst="rect">
+            <a:avLst/>
+          </a:prstGeom>
+        </p:spPr>
+      </p:pic>
+      <p:sp>
+        <p:nvSpPr>
+          <p:cNvPr id="32" name="TextBox 31">
+            <a:extLst>
+              <a:ext uri="{FF2B5EF4-FFF2-40B4-BE49-F238E27FC236}">
+                <a16:creationId xmlns:a16="http://schemas.microsoft.com/office/drawing/2014/main" id="{97DF6988-000F-5097-77B9-420FACAB081D}"/>
+              </a:ext>
+            </a:extLst>
+          </p:cNvPr>
+          <p:cNvSpPr txBox="1"/>
+          <p:nvPr/>
+        </p:nvSpPr>
+        <p:spPr>
+          <a:xfrm>
+            <a:off x="1039660" y="1947797"/>
+            <a:ext cx="694101" cy="369332"/>
+          </a:xfrm>
+          <a:prstGeom prst="rect">
+            <a:avLst/>
+          </a:prstGeom>
+          <a:noFill/>
+        </p:spPr>
+        <p:txBody>
+          <a:bodyPr wrap="none" rtlCol="0">
+            <a:spAutoFit/>
+          </a:bodyPr>
+          <a:lstStyle/>
+          <a:p>
+            <a:r>
+              <a:rPr lang="en-US" dirty="0"/>
+              <a:t>Eigen</a:t>
+            </a:r>
+          </a:p>
+        </p:txBody>
+      </p:sp>
+      <p:sp>
+        <p:nvSpPr>
+          <p:cNvPr id="33" name="TextBox 32">
+            <a:extLst>
+              <a:ext uri="{FF2B5EF4-FFF2-40B4-BE49-F238E27FC236}">
+                <a16:creationId xmlns:a16="http://schemas.microsoft.com/office/drawing/2014/main" id="{ECF1726B-1A68-DD09-81AC-6C93F79B49CF}"/>
+              </a:ext>
+            </a:extLst>
+          </p:cNvPr>
+          <p:cNvSpPr txBox="1"/>
+          <p:nvPr/>
+        </p:nvSpPr>
+        <p:spPr>
+          <a:xfrm>
+            <a:off x="4010416" y="1947797"/>
+            <a:ext cx="593432" cy="369332"/>
+          </a:xfrm>
+          <a:prstGeom prst="rect">
+            <a:avLst/>
+          </a:prstGeom>
+          <a:noFill/>
+        </p:spPr>
+        <p:txBody>
+          <a:bodyPr wrap="none" rtlCol="0">
+            <a:spAutoFit/>
+          </a:bodyPr>
+          <a:lstStyle/>
+          <a:p>
+            <a:r>
+              <a:rPr lang="en-US" dirty="0"/>
+              <a:t>Ring</a:t>
+            </a:r>
+          </a:p>
+        </p:txBody>
+      </p:sp>
+      <p:sp>
+        <p:nvSpPr>
+          <p:cNvPr id="34" name="TextBox 33">
+            <a:extLst>
+              <a:ext uri="{FF2B5EF4-FFF2-40B4-BE49-F238E27FC236}">
+                <a16:creationId xmlns:a16="http://schemas.microsoft.com/office/drawing/2014/main" id="{1690258E-B438-D216-EAAE-B0FBC38EE1BF}"/>
+              </a:ext>
+            </a:extLst>
+          </p:cNvPr>
+          <p:cNvSpPr txBox="1"/>
+          <p:nvPr/>
+        </p:nvSpPr>
+        <p:spPr>
+          <a:xfrm>
+            <a:off x="6730653" y="1997901"/>
+            <a:ext cx="1136850" cy="369332"/>
+          </a:xfrm>
+          <a:prstGeom prst="rect">
+            <a:avLst/>
+          </a:prstGeom>
+          <a:noFill/>
+        </p:spPr>
+        <p:txBody>
+          <a:bodyPr wrap="none" rtlCol="0">
+            <a:spAutoFit/>
+          </a:bodyPr>
+          <a:lstStyle/>
+          <a:p>
+            <a:r>
+              <a:rPr lang="en-US" dirty="0"/>
+              <a:t>cis-Zundel</a:t>
+            </a:r>
+          </a:p>
+        </p:txBody>
+      </p:sp>
+      <p:sp>
+        <p:nvSpPr>
+          <p:cNvPr id="35" name="TextBox 34">
+            <a:extLst>
+              <a:ext uri="{FF2B5EF4-FFF2-40B4-BE49-F238E27FC236}">
+                <a16:creationId xmlns:a16="http://schemas.microsoft.com/office/drawing/2014/main" id="{1517ABFE-A8EF-AFF1-4D68-FC10D68DD7F7}"/>
+              </a:ext>
+            </a:extLst>
+          </p:cNvPr>
+          <p:cNvSpPr txBox="1"/>
+          <p:nvPr/>
+        </p:nvSpPr>
+        <p:spPr>
+          <a:xfrm>
+            <a:off x="9732662" y="1972849"/>
+            <a:ext cx="1370953" cy="369332"/>
+          </a:xfrm>
+          <a:prstGeom prst="rect">
+            <a:avLst/>
+          </a:prstGeom>
+          <a:noFill/>
+        </p:spPr>
+        <p:txBody>
+          <a:bodyPr wrap="none" rtlCol="0">
+            <a:spAutoFit/>
+          </a:bodyPr>
+          <a:lstStyle/>
+          <a:p>
+            <a:r>
+              <a:rPr lang="en-US" dirty="0"/>
+              <a:t>trans-Zundel</a:t>
+            </a:r>
+          </a:p>
+        </p:txBody>
+      </p:sp>
+    </p:spTree>
+    <p:extLst>
+      <p:ext uri="{BB962C8B-B14F-4D97-AF65-F5344CB8AC3E}">
+        <p14:creationId xmlns:p14="http://schemas.microsoft.com/office/powerpoint/2010/main" val="690222404"/>
       </p:ext>
     </p:extLst>
   </p:cSld>
@@ -3472,7 +5834,7 @@
         <p:spPr>
           <a:xfrm>
             <a:off x="450573" y="1597026"/>
-            <a:ext cx="11307417" cy="5032374"/>
+            <a:ext cx="3816627" cy="5032374"/>
           </a:xfrm>
         </p:spPr>
         <p:txBody>
@@ -3489,37 +5851,37 @@
           <a:p>
             <a:endParaRPr lang="en-US" dirty="0"/>
           </a:p>
-          <a:p>
-            <a:r>
-              <a:rPr lang="en-US" dirty="0"/>
-              <a:t>Started doing benchmarking calculations to show the results </a:t>
-            </a:r>
-          </a:p>
-          <a:p>
-            <a:endParaRPr lang="en-US" dirty="0"/>
-          </a:p>
-          <a:p>
-            <a:r>
-              <a:rPr lang="en-US" dirty="0"/>
-              <a:t>Recreated figure 4 and 5 of the paper (bar plots comparing two algorithm)</a:t>
-            </a:r>
-          </a:p>
-          <a:p>
-            <a:pPr lvl="1"/>
-            <a:r>
-              <a:rPr lang="en-US" dirty="0"/>
-              <a:t>Figure 4 is for small test systems</a:t>
-            </a:r>
-          </a:p>
-          <a:p>
-            <a:pPr lvl="1"/>
-            <a:r>
-              <a:rPr lang="en-US" dirty="0"/>
-              <a:t>Figure 5 is for 4H2O+ (all protons quantum)</a:t>
-            </a:r>
-          </a:p>
-        </p:txBody>
-      </p:sp>
+        </p:txBody>
+      </p:sp>
+      <p:pic>
+        <p:nvPicPr>
+          <p:cNvPr id="5" name="Picture 4" descr="Text&#10;&#10;Description automatically generated with low confidence">
+            <a:extLst>
+              <a:ext uri="{FF2B5EF4-FFF2-40B4-BE49-F238E27FC236}">
+                <a16:creationId xmlns:a16="http://schemas.microsoft.com/office/drawing/2014/main" id="{35CF12CA-8073-9090-DCA8-639B8BB5BB29}"/>
+              </a:ext>
+            </a:extLst>
+          </p:cNvPr>
+          <p:cNvPicPr>
+            <a:picLocks noChangeAspect="1"/>
+          </p:cNvPicPr>
+          <p:nvPr/>
+        </p:nvPicPr>
+        <p:blipFill rotWithShape="1">
+          <a:blip r:embed="rId2"/>
+          <a:srcRect l="10079" r="26421"/>
+          <a:stretch/>
+        </p:blipFill>
+        <p:spPr>
+          <a:xfrm>
+            <a:off x="4970735" y="1690688"/>
+            <a:ext cx="6178143" cy="3751421"/>
+          </a:xfrm>
+          <a:prstGeom prst="rect">
+            <a:avLst/>
+          </a:prstGeom>
+        </p:spPr>
+      </p:pic>
     </p:spTree>
     <p:extLst>
       <p:ext uri="{BB962C8B-B14F-4D97-AF65-F5344CB8AC3E}">
@@ -3550,45 +5912,12 @@
           <a:chExt cx="0" cy="0"/>
         </a:xfrm>
       </p:grpSpPr>
-      <p:sp>
-        <p:nvSpPr>
-          <p:cNvPr id="2" name="Title 1">
-            <a:extLst>
-              <a:ext uri="{FF2B5EF4-FFF2-40B4-BE49-F238E27FC236}">
-                <a16:creationId xmlns:a16="http://schemas.microsoft.com/office/drawing/2014/main" id="{40BB8ABF-5C4A-7752-2282-C1E719C44441}"/>
-              </a:ext>
-            </a:extLst>
-          </p:cNvPr>
-          <p:cNvSpPr>
-            <a:spLocks noGrp="1"/>
-          </p:cNvSpPr>
-          <p:nvPr>
-            <p:ph type="title"/>
-          </p:nvPr>
-        </p:nvSpPr>
-        <p:spPr>
-          <a:xfrm>
-            <a:off x="339587" y="146464"/>
-            <a:ext cx="11512826" cy="1325563"/>
-          </a:xfrm>
-        </p:spPr>
-        <p:txBody>
-          <a:bodyPr/>
-          <a:lstStyle/>
-          <a:p>
-            <a:r>
-              <a:rPr lang="en-US" dirty="0"/>
-              <a:t>Now the acceleration is less obvious</a:t>
-            </a:r>
-          </a:p>
-        </p:txBody>
-      </p:sp>
       <p:pic>
         <p:nvPicPr>
-          <p:cNvPr id="7" name="Content Placeholder 6">
-            <a:extLst>
-              <a:ext uri="{FF2B5EF4-FFF2-40B4-BE49-F238E27FC236}">
-                <a16:creationId xmlns:a16="http://schemas.microsoft.com/office/drawing/2014/main" id="{CC1386D7-186F-BABC-DB59-E3921A307B16}"/>
+          <p:cNvPr id="6" name="Content Placeholder 5">
+            <a:extLst>
+              <a:ext uri="{FF2B5EF4-FFF2-40B4-BE49-F238E27FC236}">
+                <a16:creationId xmlns:a16="http://schemas.microsoft.com/office/drawing/2014/main" id="{3EF948A4-615C-AB93-AE28-0B8A5353906F}"/>
               </a:ext>
             </a:extLst>
           </p:cNvPr>
@@ -3607,47 +5936,17 @@
         </p:blipFill>
         <p:spPr>
           <a:xfrm>
-            <a:off x="112616" y="2224825"/>
-            <a:ext cx="5801784" cy="4351338"/>
+            <a:off x="5396203" y="95270"/>
+            <a:ext cx="6667459" cy="6667459"/>
           </a:xfrm>
         </p:spPr>
       </p:pic>
-      <p:pic>
-        <p:nvPicPr>
-          <p:cNvPr id="9" name="Picture 8">
-            <a:extLst>
-              <a:ext uri="{FF2B5EF4-FFF2-40B4-BE49-F238E27FC236}">
-                <a16:creationId xmlns:a16="http://schemas.microsoft.com/office/drawing/2014/main" id="{7C5330B2-74D6-F381-D2DB-4337719D667F}"/>
-              </a:ext>
-            </a:extLst>
-          </p:cNvPr>
-          <p:cNvPicPr>
-            <a:picLocks noChangeAspect="1"/>
-          </p:cNvPicPr>
-          <p:nvPr/>
-        </p:nvPicPr>
-        <p:blipFill>
-          <a:blip r:embed="rId3"/>
-          <a:stretch>
-            <a:fillRect/>
-          </a:stretch>
-        </p:blipFill>
-        <p:spPr>
-          <a:xfrm>
-            <a:off x="6521885" y="2224825"/>
-            <a:ext cx="5801784" cy="4351338"/>
-          </a:xfrm>
-          <a:prstGeom prst="rect">
-            <a:avLst/>
-          </a:prstGeom>
-        </p:spPr>
-      </p:pic>
-      <p:sp>
-        <p:nvSpPr>
-          <p:cNvPr id="12" name="TextBox 11">
-            <a:extLst>
-              <a:ext uri="{FF2B5EF4-FFF2-40B4-BE49-F238E27FC236}">
-                <a16:creationId xmlns:a16="http://schemas.microsoft.com/office/drawing/2014/main" id="{8CF80968-CA36-E2D1-B443-609C2880EBC2}"/>
+      <p:sp>
+        <p:nvSpPr>
+          <p:cNvPr id="7" name="TextBox 6">
+            <a:extLst>
+              <a:ext uri="{FF2B5EF4-FFF2-40B4-BE49-F238E27FC236}">
+                <a16:creationId xmlns:a16="http://schemas.microsoft.com/office/drawing/2014/main" id="{B2854145-175A-2EFC-4E4C-CDC4148492F4}"/>
               </a:ext>
             </a:extLst>
           </p:cNvPr>
@@ -3656,8 +5955,8 @@
         </p:nvSpPr>
         <p:spPr>
           <a:xfrm>
-            <a:off x="1114815" y="1663760"/>
-            <a:ext cx="3695178" cy="369332"/>
+            <a:off x="128338" y="1038085"/>
+            <a:ext cx="5005136" cy="4985980"/>
           </a:xfrm>
           <a:prstGeom prst="rect">
             <a:avLst/>
@@ -3670,52 +5969,90 @@
           </a:bodyPr>
           <a:lstStyle/>
           <a:p>
-            <a:r>
-              <a:rPr lang="en-US" dirty="0"/>
-              <a:t>Figure 4 Before fixing the bug:  </a:t>
-            </a:r>
-          </a:p>
-        </p:txBody>
-      </p:sp>
-      <p:sp>
-        <p:nvSpPr>
-          <p:cNvPr id="13" name="TextBox 12">
-            <a:extLst>
-              <a:ext uri="{FF2B5EF4-FFF2-40B4-BE49-F238E27FC236}">
-                <a16:creationId xmlns:a16="http://schemas.microsoft.com/office/drawing/2014/main" id="{E9D25657-DE94-D802-8CB0-4EBA79C2CA14}"/>
-              </a:ext>
-            </a:extLst>
-          </p:cNvPr>
-          <p:cNvSpPr txBox="1"/>
-          <p:nvPr/>
-        </p:nvSpPr>
-        <p:spPr>
-          <a:xfrm>
-            <a:off x="7818328" y="1663760"/>
-            <a:ext cx="3695178" cy="369332"/>
-          </a:xfrm>
-          <a:prstGeom prst="rect">
-            <a:avLst/>
-          </a:prstGeom>
-          <a:noFill/>
-        </p:spPr>
-        <p:txBody>
-          <a:bodyPr wrap="square" rtlCol="0">
-            <a:spAutoFit/>
-          </a:bodyPr>
-          <a:lstStyle/>
-          <a:p>
-            <a:r>
-              <a:rPr lang="en-US" dirty="0"/>
-              <a:t>Figure 4 After fixing the bug:  </a:t>
-            </a:r>
+            <a:br>
+              <a:rPr lang="en-US" sz="2400" dirty="0"/>
+            </a:br>
+            <a:br>
+              <a:rPr lang="en-US" sz="2400" dirty="0"/>
+            </a:br>
+            <a:r>
+              <a:rPr lang="en-US" sz="2400" dirty="0"/>
+              <a:t>SCF Profile for COH2:</a:t>
+            </a:r>
+          </a:p>
+          <a:p>
+            <a:pPr marL="342900" indent="-342900">
+              <a:buFont typeface="Arial" panose="020B0604020202020204" pitchFamily="34" charset="0"/>
+              <a:buChar char="•"/>
+            </a:pPr>
+            <a:endParaRPr lang="en-US" sz="2400" dirty="0"/>
+          </a:p>
+          <a:p>
+            <a:pPr marL="342900" indent="-342900">
+              <a:buFont typeface="Arial" panose="020B0604020202020204" pitchFamily="34" charset="0"/>
+              <a:buChar char="•"/>
+            </a:pPr>
+            <a:endParaRPr lang="en-US" sz="2400" dirty="0"/>
+          </a:p>
+          <a:p>
+            <a:pPr marL="342900" indent="-342900">
+              <a:buFont typeface="Arial" panose="020B0604020202020204" pitchFamily="34" charset="0"/>
+              <a:buChar char="•"/>
+            </a:pPr>
+            <a:r>
+              <a:rPr lang="en-US" sz="2400" dirty="0"/>
+              <a:t>Comparison against Q-chem:</a:t>
+            </a:r>
+          </a:p>
+          <a:p>
+            <a:pPr marL="342900" indent="-342900">
+              <a:buFont typeface="Arial" panose="020B0604020202020204" pitchFamily="34" charset="0"/>
+              <a:buChar char="•"/>
+            </a:pPr>
+            <a:endParaRPr lang="en-US" sz="2400" dirty="0"/>
+          </a:p>
+          <a:p>
+            <a:pPr marL="800100" lvl="1" indent="-342900">
+              <a:buFont typeface="Arial" panose="020B0604020202020204" pitchFamily="34" charset="0"/>
+              <a:buChar char="•"/>
+            </a:pPr>
+            <a:r>
+              <a:rPr lang="en-US" sz="2400" dirty="0"/>
+              <a:t>Started with the same guess</a:t>
+            </a:r>
+          </a:p>
+          <a:p>
+            <a:pPr lvl="1"/>
+            <a:r>
+              <a:rPr lang="en-US" sz="2400" dirty="0"/>
+              <a:t> </a:t>
+            </a:r>
+          </a:p>
+          <a:p>
+            <a:pPr marL="800100" lvl="1" indent="-342900">
+              <a:buFont typeface="Arial" panose="020B0604020202020204" pitchFamily="34" charset="0"/>
+              <a:buChar char="•"/>
+            </a:pPr>
+            <a:r>
+              <a:rPr lang="en-US" sz="2400" dirty="0"/>
+              <a:t>Two codes can match up very well 	</a:t>
+            </a:r>
+          </a:p>
+          <a:p>
+            <a:endParaRPr lang="en-US" dirty="0"/>
+          </a:p>
+          <a:p>
+            <a:endParaRPr lang="en-US" dirty="0"/>
+          </a:p>
+          <a:p>
+            <a:endParaRPr lang="en-US" dirty="0"/>
           </a:p>
         </p:txBody>
       </p:sp>
     </p:spTree>
     <p:extLst>
       <p:ext uri="{BB962C8B-B14F-4D97-AF65-F5344CB8AC3E}">
-        <p14:creationId xmlns:p14="http://schemas.microsoft.com/office/powerpoint/2010/main" val="2270643249"/>
+        <p14:creationId xmlns:p14="http://schemas.microsoft.com/office/powerpoint/2010/main" val="128895643"/>
       </p:ext>
     </p:extLst>
   </p:cSld>
@@ -3742,115 +6079,12 @@
           <a:chExt cx="0" cy="0"/>
         </a:xfrm>
       </p:grpSpPr>
-      <p:sp>
-        <p:nvSpPr>
-          <p:cNvPr id="2" name="Title 1">
-            <a:extLst>
-              <a:ext uri="{FF2B5EF4-FFF2-40B4-BE49-F238E27FC236}">
-                <a16:creationId xmlns:a16="http://schemas.microsoft.com/office/drawing/2014/main" id="{40BB8ABF-5C4A-7752-2282-C1E719C44441}"/>
-              </a:ext>
-            </a:extLst>
-          </p:cNvPr>
-          <p:cNvSpPr>
-            <a:spLocks noGrp="1"/>
-          </p:cNvSpPr>
-          <p:nvPr>
-            <p:ph type="title"/>
-          </p:nvPr>
-        </p:nvSpPr>
-        <p:spPr>
-          <a:xfrm>
-            <a:off x="339587" y="146464"/>
-            <a:ext cx="11512826" cy="1325563"/>
-          </a:xfrm>
-        </p:spPr>
-        <p:txBody>
-          <a:bodyPr/>
-          <a:lstStyle/>
-          <a:p>
-            <a:r>
-              <a:rPr lang="en-US" dirty="0"/>
-              <a:t>Now the acceleration is less obvious</a:t>
-            </a:r>
-          </a:p>
-        </p:txBody>
-      </p:sp>
-      <p:sp>
-        <p:nvSpPr>
-          <p:cNvPr id="12" name="TextBox 11">
-            <a:extLst>
-              <a:ext uri="{FF2B5EF4-FFF2-40B4-BE49-F238E27FC236}">
-                <a16:creationId xmlns:a16="http://schemas.microsoft.com/office/drawing/2014/main" id="{8CF80968-CA36-E2D1-B443-609C2880EBC2}"/>
-              </a:ext>
-            </a:extLst>
-          </p:cNvPr>
-          <p:cNvSpPr txBox="1"/>
-          <p:nvPr/>
-        </p:nvSpPr>
-        <p:spPr>
-          <a:xfrm>
-            <a:off x="1114815" y="1663760"/>
-            <a:ext cx="3695178" cy="369332"/>
-          </a:xfrm>
-          <a:prstGeom prst="rect">
-            <a:avLst/>
-          </a:prstGeom>
-          <a:noFill/>
-        </p:spPr>
-        <p:txBody>
-          <a:bodyPr wrap="square" rtlCol="0">
-            <a:spAutoFit/>
-          </a:bodyPr>
-          <a:lstStyle/>
-          <a:p>
-            <a:r>
-              <a:rPr lang="en-US" dirty="0"/>
-              <a:t>Figure 5 Before fixing the bug:  </a:t>
-            </a:r>
-          </a:p>
-        </p:txBody>
-      </p:sp>
-      <p:sp>
-        <p:nvSpPr>
-          <p:cNvPr id="13" name="TextBox 12">
-            <a:extLst>
-              <a:ext uri="{FF2B5EF4-FFF2-40B4-BE49-F238E27FC236}">
-                <a16:creationId xmlns:a16="http://schemas.microsoft.com/office/drawing/2014/main" id="{E9D25657-DE94-D802-8CB0-4EBA79C2CA14}"/>
-              </a:ext>
-            </a:extLst>
-          </p:cNvPr>
-          <p:cNvSpPr txBox="1"/>
-          <p:nvPr/>
-        </p:nvSpPr>
-        <p:spPr>
-          <a:xfrm>
-            <a:off x="7818328" y="1663760"/>
-            <a:ext cx="3695178" cy="369332"/>
-          </a:xfrm>
-          <a:prstGeom prst="rect">
-            <a:avLst/>
-          </a:prstGeom>
-          <a:noFill/>
-        </p:spPr>
-        <p:txBody>
-          <a:bodyPr wrap="square" rtlCol="0">
-            <a:spAutoFit/>
-          </a:bodyPr>
-          <a:lstStyle/>
-          <a:p>
-            <a:r>
-              <a:rPr lang="en-US" dirty="0"/>
-              <a:t>Figure 5 After fixing the bug:  </a:t>
-            </a:r>
-          </a:p>
-        </p:txBody>
-      </p:sp>
       <p:pic>
         <p:nvPicPr>
-          <p:cNvPr id="6" name="Content Placeholder 5">
-            <a:extLst>
-              <a:ext uri="{FF2B5EF4-FFF2-40B4-BE49-F238E27FC236}">
-                <a16:creationId xmlns:a16="http://schemas.microsoft.com/office/drawing/2014/main" id="{206E963F-0BCE-DD5F-1C2B-B66C540B8748}"/>
+          <p:cNvPr id="5" name="Content Placeholder 4">
+            <a:extLst>
+              <a:ext uri="{FF2B5EF4-FFF2-40B4-BE49-F238E27FC236}">
+                <a16:creationId xmlns:a16="http://schemas.microsoft.com/office/drawing/2014/main" id="{2ADE41F2-63C9-4BA9-2DBF-319530D45892}"/>
               </a:ext>
             </a:extLst>
           </p:cNvPr>
@@ -3869,45 +6103,15 @@
         </p:blipFill>
         <p:spPr>
           <a:xfrm>
-            <a:off x="6414275" y="2224825"/>
-            <a:ext cx="5796661" cy="4347496"/>
-          </a:xfrm>
-        </p:spPr>
-      </p:pic>
-      <p:pic>
-        <p:nvPicPr>
-          <p:cNvPr id="10" name="Picture 9">
-            <a:extLst>
-              <a:ext uri="{FF2B5EF4-FFF2-40B4-BE49-F238E27FC236}">
-                <a16:creationId xmlns:a16="http://schemas.microsoft.com/office/drawing/2014/main" id="{D940E7DD-E24C-A11E-C2D5-BEAE37690D40}"/>
-              </a:ext>
-            </a:extLst>
-          </p:cNvPr>
-          <p:cNvPicPr>
-            <a:picLocks noChangeAspect="1"/>
-          </p:cNvPicPr>
-          <p:nvPr/>
-        </p:nvPicPr>
-        <p:blipFill>
-          <a:blip r:embed="rId3"/>
-          <a:stretch>
-            <a:fillRect/>
-          </a:stretch>
-        </p:blipFill>
-        <p:spPr>
-          <a:xfrm>
-            <a:off x="27140" y="2122750"/>
-            <a:ext cx="6068860" cy="4551645"/>
-          </a:xfrm>
-          <a:prstGeom prst="rect">
-            <a:avLst/>
-          </a:prstGeom>
+            <a:off x="859316" y="596941"/>
+            <a:ext cx="9391589" cy="6261059"/>
+          </a:xfrm>
         </p:spPr>
       </p:pic>
     </p:spTree>
     <p:extLst>
       <p:ext uri="{BB962C8B-B14F-4D97-AF65-F5344CB8AC3E}">
-        <p14:creationId xmlns:p14="http://schemas.microsoft.com/office/powerpoint/2010/main" val="961488900"/>
+        <p14:creationId xmlns:p14="http://schemas.microsoft.com/office/powerpoint/2010/main" val="1980839"/>
       </p:ext>
     </p:extLst>
   </p:cSld>
@@ -3952,7 +6156,7 @@
         </p:nvSpPr>
         <p:spPr>
           <a:xfrm>
-            <a:off x="13910" y="-254914"/>
+            <a:off x="339587" y="365125"/>
             <a:ext cx="11512826" cy="1325563"/>
           </a:xfrm>
         </p:spPr>
@@ -3962,7 +6166,7 @@
           <a:p>
             <a:r>
               <a:rPr lang="en-US" dirty="0"/>
-              <a:t>Observation:</a:t>
+              <a:t>Strange behavior in STW algorithm has been fixed</a:t>
             </a:r>
           </a:p>
         </p:txBody>
@@ -3985,19 +6189,19 @@
         </p:nvSpPr>
         <p:spPr>
           <a:xfrm>
-            <a:off x="331575" y="825130"/>
-            <a:ext cx="11307417" cy="5920135"/>
+            <a:off x="450573" y="1597026"/>
+            <a:ext cx="11307417" cy="5032374"/>
           </a:xfrm>
         </p:spPr>
         <p:txBody>
           <a:bodyPr>
-            <a:normAutofit lnSpcReduction="10000"/>
+            <a:normAutofit/>
           </a:bodyPr>
           <a:lstStyle/>
           <a:p>
             <a:r>
               <a:rPr lang="en-US" dirty="0"/>
-              <a:t>Previously, we report an average saving of ~80%. Now it’s 20-30%. </a:t>
+              <a:t>The oscillation behavior was caused by gaussian’s threshold of extrapolation coefficient (obtained from B-matrix inversion). Once we increase the threshold, the SCF profile looks normal. </a:t>
             </a:r>
           </a:p>
           <a:p>
@@ -4006,166 +6210,38 @@
           <a:p>
             <a:r>
               <a:rPr lang="en-US" dirty="0"/>
-              <a:t>However, the way we define savings is by the ratio of theoretical computational cost, which is calculated as:</a:t>
+              <a:t>Started doing benchmarking calculations to show the results </a:t>
             </a:r>
           </a:p>
           <a:p>
             <a:endParaRPr lang="en-US" dirty="0"/>
           </a:p>
           <a:p>
-            <a:pPr marL="0" indent="0">
-              <a:buNone/>
-            </a:pPr>
             <a:r>
               <a:rPr lang="en-US" dirty="0"/>
-              <a:t>  	</a:t>
-            </a:r>
-          </a:p>
-          <a:p>
-            <a:pPr marL="0" indent="0">
-              <a:buNone/>
-            </a:pPr>
+              <a:t>Recreated figure 4 and 5 of the paper (bar plots comparing two algorithm)</a:t>
+            </a:r>
+          </a:p>
+          <a:p>
+            <a:pPr lvl="1"/>
             <a:r>
               <a:rPr lang="en-US" dirty="0"/>
-              <a:t>	 N</a:t>
-            </a:r>
-            <a:r>
-              <a:rPr lang="en-US" sz="2400" baseline="-25000" dirty="0"/>
-              <a:t>e</a:t>
-            </a:r>
+              <a:t>Figure 4 is for small test systems</a:t>
+            </a:r>
+          </a:p>
+          <a:p>
+            <a:pPr lvl="1"/>
             <a:r>
               <a:rPr lang="en-US" dirty="0"/>
-              <a:t>/N</a:t>
-            </a:r>
-            <a:r>
-              <a:rPr lang="en-US" baseline="-25000" dirty="0"/>
-              <a:t>p</a:t>
-            </a:r>
-            <a:r>
-              <a:rPr lang="en-US" dirty="0"/>
-              <a:t> is # of </a:t>
-            </a:r>
-            <a:r>
-              <a:rPr lang="en-US" dirty="0" err="1"/>
-              <a:t>elec</a:t>
-            </a:r>
-            <a:r>
-              <a:rPr lang="en-US" dirty="0"/>
-              <a:t>/</a:t>
-            </a:r>
-            <a:r>
-              <a:rPr lang="en-US" dirty="0" err="1"/>
-              <a:t>prot</a:t>
-            </a:r>
-            <a:r>
-              <a:rPr lang="en-US" dirty="0"/>
-              <a:t> basis functions,    </a:t>
-            </a:r>
-          </a:p>
-          <a:p>
-            <a:pPr marL="0" indent="0">
-              <a:buNone/>
-            </a:pPr>
-            <a:r>
-              <a:rPr lang="en-US" dirty="0"/>
-              <a:t>	 a</a:t>
-            </a:r>
-            <a:r>
-              <a:rPr lang="en-US" baseline="-25000" dirty="0"/>
-              <a:t>e</a:t>
-            </a:r>
-            <a:r>
-              <a:rPr lang="en-US" dirty="0"/>
-              <a:t> /a</a:t>
-            </a:r>
-            <a:r>
-              <a:rPr lang="en-US" baseline="-25000" dirty="0"/>
-              <a:t>p </a:t>
-            </a:r>
-            <a:r>
-              <a:rPr lang="en-US" dirty="0"/>
-              <a:t>is # of </a:t>
-            </a:r>
-            <a:r>
-              <a:rPr lang="en-US" dirty="0" err="1"/>
-              <a:t>elec</a:t>
-            </a:r>
-            <a:r>
-              <a:rPr lang="en-US" dirty="0"/>
-              <a:t>/</a:t>
-            </a:r>
-            <a:r>
-              <a:rPr lang="en-US" dirty="0" err="1"/>
-              <a:t>prot</a:t>
-            </a:r>
-            <a:r>
-              <a:rPr lang="en-US" dirty="0"/>
-              <a:t> </a:t>
-            </a:r>
-            <a:r>
-              <a:rPr lang="en-US" dirty="0" err="1"/>
-              <a:t>fock</a:t>
-            </a:r>
-            <a:r>
-              <a:rPr lang="en-US" dirty="0"/>
-              <a:t> builds</a:t>
-            </a:r>
-          </a:p>
-          <a:p>
-            <a:pPr marL="0" indent="0">
-              <a:buNone/>
-            </a:pPr>
-            <a:endParaRPr lang="en-US" baseline="-25000" dirty="0"/>
-          </a:p>
-          <a:p>
-            <a:r>
-              <a:rPr lang="en-US" dirty="0"/>
-              <a:t>Simultaneous algorithm converges </a:t>
-            </a:r>
-            <a:r>
-              <a:rPr lang="en-US" b="1" dirty="0"/>
-              <a:t>protonic system </a:t>
-            </a:r>
-            <a:r>
-              <a:rPr lang="en-US" dirty="0"/>
-              <a:t>faster, and reduces the total number of SCF iterations by ~80%. However, with our current test cases, the electronic basis size is a lot bigger, so the Ne^4 term is very predominant, which causes the saving to be small.</a:t>
-            </a:r>
-          </a:p>
-        </p:txBody>
-      </p:sp>
-      <p:pic>
-        <p:nvPicPr>
-          <p:cNvPr id="5" name="Picture 4" descr="Diagram, text&#10;&#10;Description automatically generated">
-            <a:extLst>
-              <a:ext uri="{FF2B5EF4-FFF2-40B4-BE49-F238E27FC236}">
-                <a16:creationId xmlns:a16="http://schemas.microsoft.com/office/drawing/2014/main" id="{B63F1A90-8D83-CDB2-C54E-5CD9096BC40C}"/>
-              </a:ext>
-            </a:extLst>
-          </p:cNvPr>
-          <p:cNvPicPr>
-            <a:picLocks noChangeAspect="1"/>
-          </p:cNvPicPr>
-          <p:nvPr/>
-        </p:nvPicPr>
-        <p:blipFill rotWithShape="1">
-          <a:blip r:embed="rId2"/>
-          <a:srcRect l="-170" t="29962" r="170" b="27672"/>
-          <a:stretch/>
-        </p:blipFill>
-        <p:spPr>
-          <a:xfrm>
-            <a:off x="2032886" y="2614810"/>
-            <a:ext cx="7378700" cy="591855"/>
-          </a:xfrm>
-          <a:prstGeom prst="rect">
-            <a:avLst/>
-          </a:prstGeom>
-        </p:spPr>
-      </p:pic>
+              <a:t>Figure 5 is for 4H2O+ (all protons quantum)</a:t>
+            </a:r>
+          </a:p>
+        </p:txBody>
+      </p:sp>
     </p:spTree>
     <p:extLst>
       <p:ext uri="{BB962C8B-B14F-4D97-AF65-F5344CB8AC3E}">
-        <p14:creationId xmlns:p14="http://schemas.microsoft.com/office/powerpoint/2010/main" val="2753706173"/>
+        <p14:creationId xmlns:p14="http://schemas.microsoft.com/office/powerpoint/2010/main" val="3919773622"/>
       </p:ext>
     </p:extLst>
   </p:cSld>
@@ -4210,7 +6286,7 @@
         </p:nvSpPr>
         <p:spPr>
           <a:xfrm>
-            <a:off x="339587" y="365125"/>
+            <a:off x="339587" y="146464"/>
             <a:ext cx="11512826" cy="1325563"/>
           </a:xfrm>
         </p:spPr>
@@ -4220,123 +6296,136 @@
           <a:p>
             <a:r>
               <a:rPr lang="en-US" dirty="0"/>
-              <a:t>So we test more basis set combinations</a:t>
-            </a:r>
-          </a:p>
-        </p:txBody>
-      </p:sp>
-      <p:sp>
-        <p:nvSpPr>
-          <p:cNvPr id="3" name="Content Placeholder 2">
-            <a:extLst>
-              <a:ext uri="{FF2B5EF4-FFF2-40B4-BE49-F238E27FC236}">
-                <a16:creationId xmlns:a16="http://schemas.microsoft.com/office/drawing/2014/main" id="{200FB233-AF1F-FAF1-E76A-2FAB13044281}"/>
-              </a:ext>
-            </a:extLst>
-          </p:cNvPr>
-          <p:cNvSpPr>
-            <a:spLocks noGrp="1"/>
-          </p:cNvSpPr>
+              <a:t>Now the acceleration is less obvious</a:t>
+            </a:r>
+          </a:p>
+        </p:txBody>
+      </p:sp>
+      <p:pic>
+        <p:nvPicPr>
+          <p:cNvPr id="7" name="Content Placeholder 6">
+            <a:extLst>
+              <a:ext uri="{FF2B5EF4-FFF2-40B4-BE49-F238E27FC236}">
+                <a16:creationId xmlns:a16="http://schemas.microsoft.com/office/drawing/2014/main" id="{CC1386D7-186F-BABC-DB59-E3921A307B16}"/>
+              </a:ext>
+            </a:extLst>
+          </p:cNvPr>
+          <p:cNvPicPr>
+            <a:picLocks noGrp="1" noChangeAspect="1"/>
+          </p:cNvPicPr>
           <p:nvPr>
             <p:ph idx="1"/>
           </p:nvPr>
-        </p:nvSpPr>
-        <p:spPr>
-          <a:xfrm>
-            <a:off x="450573" y="1597026"/>
-            <a:ext cx="11307417" cy="5032374"/>
-          </a:xfrm>
-        </p:spPr>
-        <p:txBody>
-          <a:bodyPr>
-            <a:normAutofit/>
+        </p:nvPicPr>
+        <p:blipFill>
+          <a:blip r:embed="rId2"/>
+          <a:stretch>
+            <a:fillRect/>
+          </a:stretch>
+        </p:blipFill>
+        <p:spPr>
+          <a:xfrm>
+            <a:off x="112616" y="2224825"/>
+            <a:ext cx="5801784" cy="4351338"/>
+          </a:xfrm>
+        </p:spPr>
+      </p:pic>
+      <p:pic>
+        <p:nvPicPr>
+          <p:cNvPr id="9" name="Picture 8">
+            <a:extLst>
+              <a:ext uri="{FF2B5EF4-FFF2-40B4-BE49-F238E27FC236}">
+                <a16:creationId xmlns:a16="http://schemas.microsoft.com/office/drawing/2014/main" id="{7C5330B2-74D6-F381-D2DB-4337719D667F}"/>
+              </a:ext>
+            </a:extLst>
+          </p:cNvPr>
+          <p:cNvPicPr>
+            <a:picLocks noChangeAspect="1"/>
+          </p:cNvPicPr>
+          <p:nvPr/>
+        </p:nvPicPr>
+        <p:blipFill>
+          <a:blip r:embed="rId3"/>
+          <a:stretch>
+            <a:fillRect/>
+          </a:stretch>
+        </p:blipFill>
+        <p:spPr>
+          <a:xfrm>
+            <a:off x="6521885" y="2224825"/>
+            <a:ext cx="5801784" cy="4351338"/>
+          </a:xfrm>
+          <a:prstGeom prst="rect">
+            <a:avLst/>
+          </a:prstGeom>
+        </p:spPr>
+      </p:pic>
+      <p:sp>
+        <p:nvSpPr>
+          <p:cNvPr id="12" name="TextBox 11">
+            <a:extLst>
+              <a:ext uri="{FF2B5EF4-FFF2-40B4-BE49-F238E27FC236}">
+                <a16:creationId xmlns:a16="http://schemas.microsoft.com/office/drawing/2014/main" id="{8CF80968-CA36-E2D1-B443-609C2880EBC2}"/>
+              </a:ext>
+            </a:extLst>
+          </p:cNvPr>
+          <p:cNvSpPr txBox="1"/>
+          <p:nvPr/>
+        </p:nvSpPr>
+        <p:spPr>
+          <a:xfrm>
+            <a:off x="1114815" y="1663760"/>
+            <a:ext cx="3695178" cy="369332"/>
+          </a:xfrm>
+          <a:prstGeom prst="rect">
+            <a:avLst/>
+          </a:prstGeom>
+          <a:noFill/>
+        </p:spPr>
+        <p:txBody>
+          <a:bodyPr wrap="square" rtlCol="0">
+            <a:spAutoFit/>
           </a:bodyPr>
           <a:lstStyle/>
           <a:p>
             <a:r>
               <a:rPr lang="en-US" dirty="0"/>
-              <a:t>In order to truly capture the saving of simultaneous algorithm, we tested our different basis set combinations to see if basis size plays a factor</a:t>
-            </a:r>
-          </a:p>
-          <a:p>
-            <a:endParaRPr lang="en-US" dirty="0"/>
-          </a:p>
+              <a:t>Figure 4 Before fixing the bug:  </a:t>
+            </a:r>
+          </a:p>
+        </p:txBody>
+      </p:sp>
+      <p:sp>
+        <p:nvSpPr>
+          <p:cNvPr id="13" name="TextBox 12">
+            <a:extLst>
+              <a:ext uri="{FF2B5EF4-FFF2-40B4-BE49-F238E27FC236}">
+                <a16:creationId xmlns:a16="http://schemas.microsoft.com/office/drawing/2014/main" id="{E9D25657-DE94-D802-8CB0-4EBA79C2CA14}"/>
+              </a:ext>
+            </a:extLst>
+          </p:cNvPr>
+          <p:cNvSpPr txBox="1"/>
+          <p:nvPr/>
+        </p:nvSpPr>
+        <p:spPr>
+          <a:xfrm>
+            <a:off x="7818328" y="1663760"/>
+            <a:ext cx="3695178" cy="369332"/>
+          </a:xfrm>
+          <a:prstGeom prst="rect">
+            <a:avLst/>
+          </a:prstGeom>
+          <a:noFill/>
+        </p:spPr>
+        <p:txBody>
+          <a:bodyPr wrap="square" rtlCol="0">
+            <a:spAutoFit/>
+          </a:bodyPr>
+          <a:lstStyle/>
           <a:p>
             <a:r>
               <a:rPr lang="en-US" dirty="0"/>
-              <a:t>We ran calculations on protonated water tetramer 4H2O+</a:t>
-            </a:r>
-          </a:p>
-          <a:p>
-            <a:pPr lvl="1"/>
-            <a:r>
-              <a:rPr lang="en-US" dirty="0"/>
-              <a:t>We tested the following structures and basis set:</a:t>
-            </a:r>
-            <a:br>
-              <a:rPr lang="en-US" dirty="0"/>
-            </a:br>
-            <a:endParaRPr lang="en-US" dirty="0"/>
-          </a:p>
-          <a:p>
-            <a:pPr lvl="2"/>
-            <a:r>
-              <a:rPr lang="en-US" dirty="0"/>
-              <a:t>structures = ['eigen','ring','</a:t>
-            </a:r>
-            <a:r>
-              <a:rPr lang="en-US" dirty="0" err="1"/>
-              <a:t>zundel</a:t>
-            </a:r>
-            <a:r>
-              <a:rPr lang="en-US" dirty="0"/>
-              <a:t>','</a:t>
-            </a:r>
-            <a:r>
-              <a:rPr lang="en-US" dirty="0" err="1"/>
-              <a:t>tzundel</a:t>
-            </a:r>
-            <a:r>
-              <a:rPr lang="en-US" dirty="0"/>
-              <a:t>’]</a:t>
-            </a:r>
-          </a:p>
-          <a:p>
-            <a:pPr lvl="1"/>
-            <a:endParaRPr lang="en-US" dirty="0"/>
-          </a:p>
-          <a:p>
-            <a:pPr lvl="2"/>
-            <a:r>
-              <a:rPr lang="en-US" dirty="0" err="1"/>
-              <a:t>elec_basis_pool</a:t>
-            </a:r>
-            <a:r>
-              <a:rPr lang="en-US" dirty="0"/>
-              <a:t> = ['3-21g','6-31g','4-31g','6-311g','6-311g(</a:t>
-            </a:r>
-            <a:r>
-              <a:rPr lang="en-US" dirty="0" err="1"/>
-              <a:t>d,p</a:t>
-            </a:r>
-            <a:r>
-              <a:rPr lang="en-US" dirty="0"/>
-              <a:t>)','cc-pvdz','cc-pvtz','cc-pvqz','def2svp','def2tzvp','def2qzvp’]</a:t>
-            </a:r>
-          </a:p>
-          <a:p>
-            <a:pPr lvl="2"/>
-            <a:endParaRPr lang="en-US" dirty="0"/>
-          </a:p>
-          <a:p>
-            <a:pPr lvl="2"/>
-            <a:r>
-              <a:rPr lang="en-US" dirty="0" err="1"/>
-              <a:t>prot_basis_pool</a:t>
-            </a:r>
-            <a:r>
-              <a:rPr lang="en-US" dirty="0"/>
-              <a:t> = ['protsp','pb4d','pb4f1','pb4f2','pb5d']</a:t>
+              <a:t>Figure 4 After fixing the bug:  </a:t>
             </a:r>
           </a:p>
         </p:txBody>
@@ -4344,7 +6433,7 @@
     </p:spTree>
     <p:extLst>
       <p:ext uri="{BB962C8B-B14F-4D97-AF65-F5344CB8AC3E}">
-        <p14:creationId xmlns:p14="http://schemas.microsoft.com/office/powerpoint/2010/main" val="1599603555"/>
+        <p14:creationId xmlns:p14="http://schemas.microsoft.com/office/powerpoint/2010/main" val="2270643249"/>
       </p:ext>
     </p:extLst>
   </p:cSld>
@@ -4389,7 +6478,7 @@
         </p:nvSpPr>
         <p:spPr>
           <a:xfrm>
-            <a:off x="120382" y="-4393"/>
+            <a:off x="339587" y="146464"/>
             <a:ext cx="11512826" cy="1325563"/>
           </a:xfrm>
         </p:spPr>
@@ -4399,24 +6488,96 @@
           <a:p>
             <a:r>
               <a:rPr lang="en-US" dirty="0"/>
-              <a:t>Result:</a:t>
+              <a:t>Now the acceleration is less obvious</a:t>
+            </a:r>
+          </a:p>
+        </p:txBody>
+      </p:sp>
+      <p:sp>
+        <p:nvSpPr>
+          <p:cNvPr id="12" name="TextBox 11">
+            <a:extLst>
+              <a:ext uri="{FF2B5EF4-FFF2-40B4-BE49-F238E27FC236}">
+                <a16:creationId xmlns:a16="http://schemas.microsoft.com/office/drawing/2014/main" id="{8CF80968-CA36-E2D1-B443-609C2880EBC2}"/>
+              </a:ext>
+            </a:extLst>
+          </p:cNvPr>
+          <p:cNvSpPr txBox="1"/>
+          <p:nvPr/>
+        </p:nvSpPr>
+        <p:spPr>
+          <a:xfrm>
+            <a:off x="1114815" y="1663760"/>
+            <a:ext cx="3695178" cy="369332"/>
+          </a:xfrm>
+          <a:prstGeom prst="rect">
+            <a:avLst/>
+          </a:prstGeom>
+          <a:noFill/>
+        </p:spPr>
+        <p:txBody>
+          <a:bodyPr wrap="square" rtlCol="0">
+            <a:spAutoFit/>
+          </a:bodyPr>
+          <a:lstStyle/>
+          <a:p>
+            <a:r>
+              <a:rPr lang="en-US" dirty="0"/>
+              <a:t>Figure 5 Before fixing the bug:  </a:t>
+            </a:r>
+          </a:p>
+        </p:txBody>
+      </p:sp>
+      <p:sp>
+        <p:nvSpPr>
+          <p:cNvPr id="13" name="TextBox 12">
+            <a:extLst>
+              <a:ext uri="{FF2B5EF4-FFF2-40B4-BE49-F238E27FC236}">
+                <a16:creationId xmlns:a16="http://schemas.microsoft.com/office/drawing/2014/main" id="{E9D25657-DE94-D802-8CB0-4EBA79C2CA14}"/>
+              </a:ext>
+            </a:extLst>
+          </p:cNvPr>
+          <p:cNvSpPr txBox="1"/>
+          <p:nvPr/>
+        </p:nvSpPr>
+        <p:spPr>
+          <a:xfrm>
+            <a:off x="7818328" y="1663760"/>
+            <a:ext cx="3695178" cy="369332"/>
+          </a:xfrm>
+          <a:prstGeom prst="rect">
+            <a:avLst/>
+          </a:prstGeom>
+          <a:noFill/>
+        </p:spPr>
+        <p:txBody>
+          <a:bodyPr wrap="square" rtlCol="0">
+            <a:spAutoFit/>
+          </a:bodyPr>
+          <a:lstStyle/>
+          <a:p>
+            <a:r>
+              <a:rPr lang="en-US" dirty="0"/>
+              <a:t>Figure 5 After fixing the bug:  </a:t>
             </a:r>
           </a:p>
         </p:txBody>
       </p:sp>
       <p:pic>
         <p:nvPicPr>
-          <p:cNvPr id="7" name="Picture 6">
-            <a:extLst>
-              <a:ext uri="{FF2B5EF4-FFF2-40B4-BE49-F238E27FC236}">
-                <a16:creationId xmlns:a16="http://schemas.microsoft.com/office/drawing/2014/main" id="{3DBAFF5A-949B-3386-482E-16A0530593FD}"/>
+          <p:cNvPr id="6" name="Content Placeholder 5">
+            <a:extLst>
+              <a:ext uri="{FF2B5EF4-FFF2-40B4-BE49-F238E27FC236}">
+                <a16:creationId xmlns:a16="http://schemas.microsoft.com/office/drawing/2014/main" id="{206E963F-0BCE-DD5F-1C2B-B66C540B8748}"/>
               </a:ext>
             </a:extLst>
           </p:cNvPr>
           <p:cNvPicPr>
-            <a:picLocks noChangeAspect="1"/>
+            <a:picLocks noGrp="1" noChangeAspect="1"/>
           </p:cNvPicPr>
-          <p:nvPr/>
+          <p:nvPr>
+            <p:ph idx="1"/>
+          </p:nvPr>
         </p:nvPicPr>
         <p:blipFill>
           <a:blip r:embed="rId2"/>
@@ -4426,71 +6587,45 @@
         </p:blipFill>
         <p:spPr>
           <a:xfrm>
-            <a:off x="3582966" y="532487"/>
-            <a:ext cx="9707149" cy="6471433"/>
+            <a:off x="6414275" y="2224825"/>
+            <a:ext cx="5796661" cy="4347496"/>
+          </a:xfrm>
+        </p:spPr>
+      </p:pic>
+      <p:pic>
+        <p:nvPicPr>
+          <p:cNvPr id="10" name="Picture 9">
+            <a:extLst>
+              <a:ext uri="{FF2B5EF4-FFF2-40B4-BE49-F238E27FC236}">
+                <a16:creationId xmlns:a16="http://schemas.microsoft.com/office/drawing/2014/main" id="{D940E7DD-E24C-A11E-C2D5-BEAE37690D40}"/>
+              </a:ext>
+            </a:extLst>
+          </p:cNvPr>
+          <p:cNvPicPr>
+            <a:picLocks noChangeAspect="1"/>
+          </p:cNvPicPr>
+          <p:nvPr/>
+        </p:nvPicPr>
+        <p:blipFill>
+          <a:blip r:embed="rId3"/>
+          <a:stretch>
+            <a:fillRect/>
+          </a:stretch>
+        </p:blipFill>
+        <p:spPr>
+          <a:xfrm>
+            <a:off x="27140" y="2122750"/>
+            <a:ext cx="6068860" cy="4551645"/>
           </a:xfrm>
           <a:prstGeom prst="rect">
             <a:avLst/>
           </a:prstGeom>
         </p:spPr>
       </p:pic>
-      <p:sp>
-        <p:nvSpPr>
-          <p:cNvPr id="8" name="TextBox 7">
-            <a:extLst>
-              <a:ext uri="{FF2B5EF4-FFF2-40B4-BE49-F238E27FC236}">
-                <a16:creationId xmlns:a16="http://schemas.microsoft.com/office/drawing/2014/main" id="{19485207-76E5-8EAF-398D-52203F232DC2}"/>
-              </a:ext>
-            </a:extLst>
-          </p:cNvPr>
-          <p:cNvSpPr txBox="1"/>
-          <p:nvPr/>
-        </p:nvSpPr>
-        <p:spPr>
-          <a:xfrm>
-            <a:off x="76541" y="1479029"/>
-            <a:ext cx="3837844" cy="5016758"/>
-          </a:xfrm>
-          <a:prstGeom prst="rect">
-            <a:avLst/>
-          </a:prstGeom>
-          <a:noFill/>
-        </p:spPr>
-        <p:txBody>
-          <a:bodyPr wrap="square" rtlCol="0">
-            <a:spAutoFit/>
-          </a:bodyPr>
-          <a:lstStyle/>
-          <a:p>
-            <a:r>
-              <a:rPr lang="en-US" sz="2000" dirty="0"/>
-              <a:t>We know from experience that the protonic system is generally harder to converge. And simultaneous optimization can help converge protonic faster.</a:t>
-            </a:r>
-          </a:p>
-          <a:p>
-            <a:endParaRPr lang="en-US" sz="2000" dirty="0"/>
-          </a:p>
-          <a:p>
-            <a:endParaRPr lang="en-US" sz="2000" dirty="0"/>
-          </a:p>
-          <a:p>
-            <a:r>
-              <a:rPr lang="en-US" sz="2000" dirty="0"/>
-              <a:t>Therefore, as one would expect, when protonic basis gets larger, and the protonic basis size gets more comparable to electronic basis size, we see a better saving vs the traditional stepwise optimization</a:t>
-            </a:r>
-          </a:p>
-          <a:p>
-            <a:endParaRPr lang="en-US" sz="2000" dirty="0"/>
-          </a:p>
-          <a:p>
-            <a:endParaRPr lang="en-US" sz="2000" dirty="0"/>
-          </a:p>
-        </p:txBody>
-      </p:sp>
     </p:spTree>
     <p:extLst>
       <p:ext uri="{BB962C8B-B14F-4D97-AF65-F5344CB8AC3E}">
-        <p14:creationId xmlns:p14="http://schemas.microsoft.com/office/powerpoint/2010/main" val="2442417095"/>
+        <p14:creationId xmlns:p14="http://schemas.microsoft.com/office/powerpoint/2010/main" val="961488900"/>
       </p:ext>
     </p:extLst>
   </p:cSld>
@@ -4535,7 +6670,7 @@
         </p:nvSpPr>
         <p:spPr>
           <a:xfrm>
-            <a:off x="120382" y="-4393"/>
+            <a:off x="13910" y="-254914"/>
             <a:ext cx="11512826" cy="1325563"/>
           </a:xfrm>
         </p:spPr>
@@ -4545,17 +6680,183 @@
           <a:p>
             <a:r>
               <a:rPr lang="en-US" dirty="0"/>
-              <a:t>Zoom in on lower left:</a:t>
+              <a:t>Observation:</a:t>
+            </a:r>
+          </a:p>
+        </p:txBody>
+      </p:sp>
+      <p:sp>
+        <p:nvSpPr>
+          <p:cNvPr id="3" name="Content Placeholder 2">
+            <a:extLst>
+              <a:ext uri="{FF2B5EF4-FFF2-40B4-BE49-F238E27FC236}">
+                <a16:creationId xmlns:a16="http://schemas.microsoft.com/office/drawing/2014/main" id="{200FB233-AF1F-FAF1-E76A-2FAB13044281}"/>
+              </a:ext>
+            </a:extLst>
+          </p:cNvPr>
+          <p:cNvSpPr>
+            <a:spLocks noGrp="1"/>
+          </p:cNvSpPr>
+          <p:nvPr>
+            <p:ph idx="1"/>
+          </p:nvPr>
+        </p:nvSpPr>
+        <p:spPr>
+          <a:xfrm>
+            <a:off x="331575" y="825130"/>
+            <a:ext cx="11307417" cy="5920135"/>
+          </a:xfrm>
+        </p:spPr>
+        <p:txBody>
+          <a:bodyPr>
+            <a:normAutofit lnSpcReduction="10000"/>
+          </a:bodyPr>
+          <a:lstStyle/>
+          <a:p>
+            <a:r>
+              <a:rPr lang="en-US" dirty="0"/>
+              <a:t>Previously, we report an average saving of ~80%. Now it’s 20-30%. </a:t>
+            </a:r>
+          </a:p>
+          <a:p>
+            <a:endParaRPr lang="en-US" dirty="0"/>
+          </a:p>
+          <a:p>
+            <a:r>
+              <a:rPr lang="en-US" dirty="0"/>
+              <a:t>However, the way we define savings is by the ratio of theoretical computational cost, which is calculated as:</a:t>
+            </a:r>
+          </a:p>
+          <a:p>
+            <a:endParaRPr lang="en-US" dirty="0"/>
+          </a:p>
+          <a:p>
+            <a:pPr marL="0" indent="0">
+              <a:buNone/>
+            </a:pPr>
+            <a:r>
+              <a:rPr lang="en-US" dirty="0"/>
+              <a:t>  	</a:t>
+            </a:r>
+          </a:p>
+          <a:p>
+            <a:pPr marL="0" indent="0">
+              <a:buNone/>
+            </a:pPr>
+            <a:r>
+              <a:rPr lang="en-US" dirty="0"/>
+              <a:t>	 N</a:t>
+            </a:r>
+            <a:r>
+              <a:rPr lang="en-US" sz="2400" baseline="-25000" dirty="0"/>
+              <a:t>e</a:t>
+            </a:r>
+            <a:r>
+              <a:rPr lang="en-US" dirty="0"/>
+              <a:t>/N</a:t>
+            </a:r>
+            <a:r>
+              <a:rPr lang="en-US" baseline="-25000" dirty="0"/>
+              <a:t>p</a:t>
+            </a:r>
+            <a:r>
+              <a:rPr lang="en-US" dirty="0"/>
+              <a:t> is # of </a:t>
+            </a:r>
+            <a:r>
+              <a:rPr lang="en-US" dirty="0" err="1"/>
+              <a:t>elec</a:t>
+            </a:r>
+            <a:r>
+              <a:rPr lang="en-US" dirty="0"/>
+              <a:t>/</a:t>
+            </a:r>
+            <a:r>
+              <a:rPr lang="en-US" dirty="0" err="1"/>
+              <a:t>prot</a:t>
+            </a:r>
+            <a:r>
+              <a:rPr lang="en-US" dirty="0"/>
+              <a:t> basis functions,    </a:t>
+            </a:r>
+          </a:p>
+          <a:p>
+            <a:pPr marL="0" indent="0">
+              <a:buNone/>
+            </a:pPr>
+            <a:r>
+              <a:rPr lang="en-US" dirty="0"/>
+              <a:t>	 a</a:t>
+            </a:r>
+            <a:r>
+              <a:rPr lang="en-US" baseline="-25000" dirty="0"/>
+              <a:t>e</a:t>
+            </a:r>
+            <a:r>
+              <a:rPr lang="en-US" dirty="0"/>
+              <a:t> /a</a:t>
+            </a:r>
+            <a:r>
+              <a:rPr lang="en-US" baseline="-25000" dirty="0"/>
+              <a:t>p </a:t>
+            </a:r>
+            <a:r>
+              <a:rPr lang="en-US" dirty="0"/>
+              <a:t>is # of </a:t>
+            </a:r>
+            <a:r>
+              <a:rPr lang="en-US" dirty="0" err="1"/>
+              <a:t>elec</a:t>
+            </a:r>
+            <a:r>
+              <a:rPr lang="en-US" dirty="0"/>
+              <a:t>/</a:t>
+            </a:r>
+            <a:r>
+              <a:rPr lang="en-US" dirty="0" err="1"/>
+              <a:t>prot</a:t>
+            </a:r>
+            <a:r>
+              <a:rPr lang="en-US" dirty="0"/>
+              <a:t> </a:t>
+            </a:r>
+            <a:r>
+              <a:rPr lang="en-US" dirty="0" err="1"/>
+              <a:t>fock</a:t>
+            </a:r>
+            <a:r>
+              <a:rPr lang="en-US" dirty="0"/>
+              <a:t> builds</a:t>
+            </a:r>
+          </a:p>
+          <a:p>
+            <a:pPr marL="0" indent="0">
+              <a:buNone/>
+            </a:pPr>
+            <a:endParaRPr lang="en-US" baseline="-25000" dirty="0"/>
+          </a:p>
+          <a:p>
+            <a:r>
+              <a:rPr lang="en-US" dirty="0"/>
+              <a:t>Simultaneous algorithm converges </a:t>
+            </a:r>
+            <a:r>
+              <a:rPr lang="en-US" b="1" dirty="0"/>
+              <a:t>protonic system </a:t>
+            </a:r>
+            <a:r>
+              <a:rPr lang="en-US" dirty="0"/>
+              <a:t>faster, and reduces the total number of SCF iterations by ~80%. However, with our current test cases, the electronic basis size is a lot bigger, so the Ne^4 term is very predominant, which causes the saving to be small.</a:t>
             </a:r>
           </a:p>
         </p:txBody>
       </p:sp>
       <p:pic>
         <p:nvPicPr>
-          <p:cNvPr id="6" name="Picture 5">
-            <a:extLst>
-              <a:ext uri="{FF2B5EF4-FFF2-40B4-BE49-F238E27FC236}">
-                <a16:creationId xmlns:a16="http://schemas.microsoft.com/office/drawing/2014/main" id="{4F2C7842-7A28-36BC-94C5-9DA9B6193544}"/>
+          <p:cNvPr id="5" name="Picture 4" descr="Diagram, text&#10;&#10;Description automatically generated">
+            <a:extLst>
+              <a:ext uri="{FF2B5EF4-FFF2-40B4-BE49-F238E27FC236}">
+                <a16:creationId xmlns:a16="http://schemas.microsoft.com/office/drawing/2014/main" id="{B63F1A90-8D83-CDB2-C54E-5CD9096BC40C}"/>
               </a:ext>
             </a:extLst>
           </p:cNvPr>
@@ -4564,139 +6865,25 @@
           </p:cNvPicPr>
           <p:nvPr/>
         </p:nvPicPr>
-        <p:blipFill>
+        <p:blipFill rotWithShape="1">
           <a:blip r:embed="rId2"/>
-          <a:stretch>
-            <a:fillRect/>
-          </a:stretch>
+          <a:srcRect l="-170" t="29962" r="170" b="27672"/>
+          <a:stretch/>
         </p:blipFill>
         <p:spPr>
           <a:xfrm>
-            <a:off x="6159853" y="605609"/>
-            <a:ext cx="6773269" cy="4515513"/>
+            <a:off x="2032886" y="2614810"/>
+            <a:ext cx="7378700" cy="591855"/>
           </a:xfrm>
           <a:prstGeom prst="rect">
             <a:avLst/>
           </a:prstGeom>
         </p:spPr>
       </p:pic>
-      <p:pic>
-        <p:nvPicPr>
-          <p:cNvPr id="10" name="Picture 9">
-            <a:extLst>
-              <a:ext uri="{FF2B5EF4-FFF2-40B4-BE49-F238E27FC236}">
-                <a16:creationId xmlns:a16="http://schemas.microsoft.com/office/drawing/2014/main" id="{87DD6CD7-BFF4-2350-D267-0A914AE7B493}"/>
-              </a:ext>
-            </a:extLst>
-          </p:cNvPr>
-          <p:cNvPicPr>
-            <a:picLocks noChangeAspect="1"/>
-          </p:cNvPicPr>
-          <p:nvPr/>
-        </p:nvPicPr>
-        <p:blipFill>
-          <a:blip r:embed="rId3"/>
-          <a:stretch>
-            <a:fillRect/>
-          </a:stretch>
-        </p:blipFill>
-        <p:spPr>
-          <a:xfrm>
-            <a:off x="-111861" y="533128"/>
-            <a:ext cx="6773269" cy="4515513"/>
-          </a:xfrm>
-          <a:prstGeom prst="rect">
-            <a:avLst/>
-          </a:prstGeom>
-        </p:spPr>
-      </p:pic>
-      <p:sp>
-        <p:nvSpPr>
-          <p:cNvPr id="14" name="TextBox 13">
-            <a:extLst>
-              <a:ext uri="{FF2B5EF4-FFF2-40B4-BE49-F238E27FC236}">
-                <a16:creationId xmlns:a16="http://schemas.microsoft.com/office/drawing/2014/main" id="{A8B91711-15B8-2FEC-1225-58844E3BF7E1}"/>
-              </a:ext>
-            </a:extLst>
-          </p:cNvPr>
-          <p:cNvSpPr txBox="1"/>
-          <p:nvPr/>
-        </p:nvSpPr>
-        <p:spPr>
-          <a:xfrm>
-            <a:off x="266177" y="5124543"/>
-            <a:ext cx="11527078" cy="1323439"/>
-          </a:xfrm>
-          <a:prstGeom prst="rect">
-            <a:avLst/>
-          </a:prstGeom>
-          <a:noFill/>
-        </p:spPr>
-        <p:txBody>
-          <a:bodyPr wrap="square" rtlCol="0">
-            <a:spAutoFit/>
-          </a:bodyPr>
-          <a:lstStyle/>
-          <a:p>
-            <a:pPr marL="285750" indent="-285750">
-              <a:buFont typeface="Arial" panose="020B0604020202020204" pitchFamily="34" charset="0"/>
-              <a:buChar char="•"/>
-            </a:pPr>
-            <a:r>
-              <a:rPr lang="en-US" sz="2000" dirty="0"/>
-              <a:t>The lower left part of the last slide was strange, so we zoom in to see what’s going on</a:t>
-            </a:r>
-          </a:p>
-          <a:p>
-            <a:pPr marL="285750" indent="-285750">
-              <a:buFont typeface="Arial" panose="020B0604020202020204" pitchFamily="34" charset="0"/>
-              <a:buChar char="•"/>
-            </a:pPr>
-            <a:r>
-              <a:rPr lang="en-US" sz="2000" dirty="0"/>
-              <a:t>I labeled ‘first letter of the structure | electronic basis | protonic </a:t>
-            </a:r>
-            <a:r>
-              <a:rPr lang="en-US" sz="2000" dirty="0" err="1"/>
-              <a:t>basis’</a:t>
-            </a:r>
-            <a:r>
-              <a:rPr lang="en-US" sz="2000" dirty="0"/>
-              <a:t> on the graph</a:t>
-            </a:r>
-          </a:p>
-          <a:p>
-            <a:pPr marL="285750" indent="-285750">
-              <a:buFont typeface="Arial" panose="020B0604020202020204" pitchFamily="34" charset="0"/>
-              <a:buChar char="•"/>
-            </a:pPr>
-            <a:r>
-              <a:rPr lang="en-US" sz="2000" dirty="0"/>
-              <a:t>It seems like the random trend on the lower left was caused by </a:t>
-            </a:r>
-            <a:r>
-              <a:rPr lang="en-US" sz="2000" dirty="0" err="1"/>
-              <a:t>prot-sp</a:t>
-            </a:r>
-            <a:r>
-              <a:rPr lang="en-US" sz="2000" dirty="0"/>
-              <a:t> basis, combining with very large electronic basis set. I suggest we remove </a:t>
-            </a:r>
-            <a:r>
-              <a:rPr lang="en-US" sz="2000" dirty="0" err="1"/>
-              <a:t>prot-sp</a:t>
-            </a:r>
-            <a:r>
-              <a:rPr lang="en-US" sz="2000" dirty="0"/>
-              <a:t> data to see the trend clearer. </a:t>
-            </a:r>
-          </a:p>
-        </p:txBody>
-      </p:sp>
     </p:spTree>
     <p:extLst>
       <p:ext uri="{BB962C8B-B14F-4D97-AF65-F5344CB8AC3E}">
-        <p14:creationId xmlns:p14="http://schemas.microsoft.com/office/powerpoint/2010/main" val="4037144729"/>
+        <p14:creationId xmlns:p14="http://schemas.microsoft.com/office/powerpoint/2010/main" val="2753706173"/>
       </p:ext>
     </p:extLst>
   </p:cSld>
@@ -4741,7 +6928,7 @@
         </p:nvSpPr>
         <p:spPr>
           <a:xfrm>
-            <a:off x="120382" y="-4393"/>
+            <a:off x="339587" y="365125"/>
             <a:ext cx="11512826" cy="1325563"/>
           </a:xfrm>
         </p:spPr>
@@ -4751,53 +6938,131 @@
           <a:p>
             <a:r>
               <a:rPr lang="en-US" dirty="0"/>
-              <a:t>Result (removing </a:t>
+              <a:t>So we test more basis set combinations</a:t>
+            </a:r>
+          </a:p>
+        </p:txBody>
+      </p:sp>
+      <p:sp>
+        <p:nvSpPr>
+          <p:cNvPr id="3" name="Content Placeholder 2">
+            <a:extLst>
+              <a:ext uri="{FF2B5EF4-FFF2-40B4-BE49-F238E27FC236}">
+                <a16:creationId xmlns:a16="http://schemas.microsoft.com/office/drawing/2014/main" id="{200FB233-AF1F-FAF1-E76A-2FAB13044281}"/>
+              </a:ext>
+            </a:extLst>
+          </p:cNvPr>
+          <p:cNvSpPr>
+            <a:spLocks noGrp="1"/>
+          </p:cNvSpPr>
+          <p:nvPr>
+            <p:ph idx="1"/>
+          </p:nvPr>
+        </p:nvSpPr>
+        <p:spPr>
+          <a:xfrm>
+            <a:off x="450573" y="1597026"/>
+            <a:ext cx="11307417" cy="5032374"/>
+          </a:xfrm>
+        </p:spPr>
+        <p:txBody>
+          <a:bodyPr>
+            <a:normAutofit/>
+          </a:bodyPr>
+          <a:lstStyle/>
+          <a:p>
+            <a:r>
+              <a:rPr lang="en-US" dirty="0"/>
+              <a:t>In order to truly capture the saving of simultaneous algorithm, we tested our different basis set combinations to see if basis size plays a factor</a:t>
+            </a:r>
+          </a:p>
+          <a:p>
+            <a:endParaRPr lang="en-US" dirty="0"/>
+          </a:p>
+          <a:p>
+            <a:r>
+              <a:rPr lang="en-US" dirty="0"/>
+              <a:t>We ran calculations on protonated water tetramer 4H2O+</a:t>
+            </a:r>
+          </a:p>
+          <a:p>
+            <a:pPr lvl="1"/>
+            <a:r>
+              <a:rPr lang="en-US" dirty="0"/>
+              <a:t>We tested the following structures and basis set:</a:t>
+            </a:r>
+            <a:br>
+              <a:rPr lang="en-US" dirty="0"/>
+            </a:br>
+            <a:endParaRPr lang="en-US" dirty="0"/>
+          </a:p>
+          <a:p>
+            <a:pPr lvl="2"/>
+            <a:r>
+              <a:rPr lang="en-US" dirty="0"/>
+              <a:t>structures = ['eigen','ring','</a:t>
             </a:r>
             <a:r>
               <a:rPr lang="en-US" dirty="0" err="1"/>
-              <a:t>prot-sp</a:t>
+              <a:t>zundel</a:t>
             </a:r>
             <a:r>
               <a:rPr lang="en-US" dirty="0"/>
-              <a:t> basis)</a:t>
-            </a:r>
-          </a:p>
-        </p:txBody>
-      </p:sp>
-      <p:pic>
-        <p:nvPicPr>
-          <p:cNvPr id="4" name="Picture 3">
-            <a:extLst>
-              <a:ext uri="{FF2B5EF4-FFF2-40B4-BE49-F238E27FC236}">
-                <a16:creationId xmlns:a16="http://schemas.microsoft.com/office/drawing/2014/main" id="{A21CB76D-183D-5D7E-9764-25907A40EFD9}"/>
-              </a:ext>
-            </a:extLst>
-          </p:cNvPr>
-          <p:cNvPicPr>
-            <a:picLocks noChangeAspect="1"/>
-          </p:cNvPicPr>
-          <p:nvPr/>
-        </p:nvPicPr>
-        <p:blipFill>
-          <a:blip r:embed="rId2"/>
-          <a:stretch>
-            <a:fillRect/>
-          </a:stretch>
-        </p:blipFill>
-        <p:spPr>
-          <a:xfrm>
-            <a:off x="1496861" y="444674"/>
-            <a:ext cx="10287000" cy="6858000"/>
-          </a:xfrm>
-          <a:prstGeom prst="rect">
-            <a:avLst/>
-          </a:prstGeom>
-        </p:spPr>
-      </p:pic>
+              <a:t>','</a:t>
+            </a:r>
+            <a:r>
+              <a:rPr lang="en-US" dirty="0" err="1"/>
+              <a:t>tzundel</a:t>
+            </a:r>
+            <a:r>
+              <a:rPr lang="en-US" dirty="0"/>
+              <a:t>’]</a:t>
+            </a:r>
+          </a:p>
+          <a:p>
+            <a:pPr lvl="1"/>
+            <a:endParaRPr lang="en-US" dirty="0"/>
+          </a:p>
+          <a:p>
+            <a:pPr lvl="2"/>
+            <a:r>
+              <a:rPr lang="en-US" dirty="0" err="1"/>
+              <a:t>elec_basis_pool</a:t>
+            </a:r>
+            <a:r>
+              <a:rPr lang="en-US" dirty="0"/>
+              <a:t> = ['3-21g','6-31g','4-31g','6-311g','6-311g(</a:t>
+            </a:r>
+            <a:r>
+              <a:rPr lang="en-US" dirty="0" err="1"/>
+              <a:t>d,p</a:t>
+            </a:r>
+            <a:r>
+              <a:rPr lang="en-US" dirty="0"/>
+              <a:t>)','cc-pvdz','cc-pvtz','cc-pvqz','def2svp','def2tzvp','def2qzvp’]</a:t>
+            </a:r>
+          </a:p>
+          <a:p>
+            <a:pPr lvl="2"/>
+            <a:endParaRPr lang="en-US" dirty="0"/>
+          </a:p>
+          <a:p>
+            <a:pPr lvl="2"/>
+            <a:r>
+              <a:rPr lang="en-US" dirty="0" err="1"/>
+              <a:t>prot_basis_pool</a:t>
+            </a:r>
+            <a:r>
+              <a:rPr lang="en-US" dirty="0"/>
+              <a:t> = ['protsp','pb4d','pb4f1','pb4f2','pb5d']</a:t>
+            </a:r>
+          </a:p>
+        </p:txBody>
+      </p:sp>
     </p:spTree>
     <p:extLst>
       <p:ext uri="{BB962C8B-B14F-4D97-AF65-F5344CB8AC3E}">
-        <p14:creationId xmlns:p14="http://schemas.microsoft.com/office/powerpoint/2010/main" val="1262847335"/>
+        <p14:creationId xmlns:p14="http://schemas.microsoft.com/office/powerpoint/2010/main" val="1599603555"/>
       </p:ext>
     </p:extLst>
   </p:cSld>

</xml_diff>